<commit_message>
Slicing pictures is also annoying and tiring...
Add 4*4 pictures of Alice !
Complete the moving animation system for players in fight.py;
Fixed the empty-username bug.
</commit_message>
<xml_diff>
--- a/Pictures/草稿纸.pptx
+++ b/Pictures/草稿纸.pptx
@@ -13,6 +13,8 @@
     <p:sldId id="261" r:id="rId7"/>
     <p:sldId id="262" r:id="rId8"/>
     <p:sldId id="263" r:id="rId9"/>
+    <p:sldId id="264" r:id="rId10"/>
+    <p:sldId id="265" r:id="rId11"/>
   </p:sldIdLst>
   <p:sldSz cx="12192000" cy="6858000"/>
   <p:notesSz cx="6858000" cy="9144000"/>
@@ -266,7 +268,7 @@
           <a:p>
             <a:fld id="{ED8AD0AC-0BAE-4D9B-8B49-2B6B690D8953}" type="datetimeFigureOut">
               <a:rPr lang="zh-CN" altLang="en-US" smtClean="0"/>
-              <a:t>2024/12/15</a:t>
+              <a:t>2024/12/30</a:t>
             </a:fld>
             <a:endParaRPr lang="zh-CN" altLang="en-US"/>
           </a:p>
@@ -464,7 +466,7 @@
           <a:p>
             <a:fld id="{ED8AD0AC-0BAE-4D9B-8B49-2B6B690D8953}" type="datetimeFigureOut">
               <a:rPr lang="zh-CN" altLang="en-US" smtClean="0"/>
-              <a:t>2024/12/15</a:t>
+              <a:t>2024/12/30</a:t>
             </a:fld>
             <a:endParaRPr lang="zh-CN" altLang="en-US"/>
           </a:p>
@@ -672,7 +674,7 @@
           <a:p>
             <a:fld id="{ED8AD0AC-0BAE-4D9B-8B49-2B6B690D8953}" type="datetimeFigureOut">
               <a:rPr lang="zh-CN" altLang="en-US" smtClean="0"/>
-              <a:t>2024/12/15</a:t>
+              <a:t>2024/12/30</a:t>
             </a:fld>
             <a:endParaRPr lang="zh-CN" altLang="en-US"/>
           </a:p>
@@ -870,7 +872,7 @@
           <a:p>
             <a:fld id="{ED8AD0AC-0BAE-4D9B-8B49-2B6B690D8953}" type="datetimeFigureOut">
               <a:rPr lang="zh-CN" altLang="en-US" smtClean="0"/>
-              <a:t>2024/12/15</a:t>
+              <a:t>2024/12/30</a:t>
             </a:fld>
             <a:endParaRPr lang="zh-CN" altLang="en-US"/>
           </a:p>
@@ -1145,7 +1147,7 @@
           <a:p>
             <a:fld id="{ED8AD0AC-0BAE-4D9B-8B49-2B6B690D8953}" type="datetimeFigureOut">
               <a:rPr lang="zh-CN" altLang="en-US" smtClean="0"/>
-              <a:t>2024/12/15</a:t>
+              <a:t>2024/12/30</a:t>
             </a:fld>
             <a:endParaRPr lang="zh-CN" altLang="en-US"/>
           </a:p>
@@ -1410,7 +1412,7 @@
           <a:p>
             <a:fld id="{ED8AD0AC-0BAE-4D9B-8B49-2B6B690D8953}" type="datetimeFigureOut">
               <a:rPr lang="zh-CN" altLang="en-US" smtClean="0"/>
-              <a:t>2024/12/15</a:t>
+              <a:t>2024/12/30</a:t>
             </a:fld>
             <a:endParaRPr lang="zh-CN" altLang="en-US"/>
           </a:p>
@@ -1822,7 +1824,7 @@
           <a:p>
             <a:fld id="{ED8AD0AC-0BAE-4D9B-8B49-2B6B690D8953}" type="datetimeFigureOut">
               <a:rPr lang="zh-CN" altLang="en-US" smtClean="0"/>
-              <a:t>2024/12/15</a:t>
+              <a:t>2024/12/30</a:t>
             </a:fld>
             <a:endParaRPr lang="zh-CN" altLang="en-US"/>
           </a:p>
@@ -1963,7 +1965,7 @@
           <a:p>
             <a:fld id="{ED8AD0AC-0BAE-4D9B-8B49-2B6B690D8953}" type="datetimeFigureOut">
               <a:rPr lang="zh-CN" altLang="en-US" smtClean="0"/>
-              <a:t>2024/12/15</a:t>
+              <a:t>2024/12/30</a:t>
             </a:fld>
             <a:endParaRPr lang="zh-CN" altLang="en-US"/>
           </a:p>
@@ -2076,7 +2078,7 @@
           <a:p>
             <a:fld id="{ED8AD0AC-0BAE-4D9B-8B49-2B6B690D8953}" type="datetimeFigureOut">
               <a:rPr lang="zh-CN" altLang="en-US" smtClean="0"/>
-              <a:t>2024/12/15</a:t>
+              <a:t>2024/12/30</a:t>
             </a:fld>
             <a:endParaRPr lang="zh-CN" altLang="en-US"/>
           </a:p>
@@ -2387,7 +2389,7 @@
           <a:p>
             <a:fld id="{ED8AD0AC-0BAE-4D9B-8B49-2B6B690D8953}" type="datetimeFigureOut">
               <a:rPr lang="zh-CN" altLang="en-US" smtClean="0"/>
-              <a:t>2024/12/15</a:t>
+              <a:t>2024/12/30</a:t>
             </a:fld>
             <a:endParaRPr lang="zh-CN" altLang="en-US"/>
           </a:p>
@@ -2675,7 +2677,7 @@
           <a:p>
             <a:fld id="{ED8AD0AC-0BAE-4D9B-8B49-2B6B690D8953}" type="datetimeFigureOut">
               <a:rPr lang="zh-CN" altLang="en-US" smtClean="0"/>
-              <a:t>2024/12/15</a:t>
+              <a:t>2024/12/30</a:t>
             </a:fld>
             <a:endParaRPr lang="zh-CN" altLang="en-US"/>
           </a:p>
@@ -2919,7 +2921,7 @@
           <a:p>
             <a:fld id="{ED8AD0AC-0BAE-4D9B-8B49-2B6B690D8953}" type="datetimeFigureOut">
               <a:rPr lang="zh-CN" altLang="en-US" smtClean="0"/>
-              <a:t>2024/12/15</a:t>
+              <a:t>2024/12/30</a:t>
             </a:fld>
             <a:endParaRPr lang="zh-CN" altLang="en-US"/>
           </a:p>
@@ -3420,6 +3422,86 @@
     <p:extLst>
       <p:ext uri="{BB962C8B-B14F-4D97-AF65-F5344CB8AC3E}">
         <p14:creationId xmlns:p14="http://schemas.microsoft.com/office/powerpoint/2010/main" val="3101256104"/>
+      </p:ext>
+    </p:extLst>
+  </p:cSld>
+  <p:clrMapOvr>
+    <a:masterClrMapping/>
+  </p:clrMapOvr>
+</p:sld>
+</file>
+
+<file path=ppt/slides/slide10.xml><?xml version="1.0" encoding="utf-8"?>
+<p:sld xmlns:a="http://schemas.openxmlformats.org/drawingml/2006/main" xmlns:r="http://schemas.openxmlformats.org/officeDocument/2006/relationships" xmlns:p="http://schemas.openxmlformats.org/presentationml/2006/main">
+  <p:cSld>
+    <p:spTree>
+      <p:nvGrpSpPr>
+        <p:cNvPr id="1" name=""/>
+        <p:cNvGrpSpPr/>
+        <p:nvPr/>
+      </p:nvGrpSpPr>
+      <p:grpSpPr>
+        <a:xfrm>
+          <a:off x="0" y="0"/>
+          <a:ext cx="0" cy="0"/>
+          <a:chOff x="0" y="0"/>
+          <a:chExt cx="0" cy="0"/>
+        </a:xfrm>
+      </p:grpSpPr>
+      <p:sp>
+        <p:nvSpPr>
+          <p:cNvPr id="2" name="标题 1">
+            <a:extLst>
+              <a:ext uri="{FF2B5EF4-FFF2-40B4-BE49-F238E27FC236}">
+                <a16:creationId xmlns:a16="http://schemas.microsoft.com/office/drawing/2014/main" id="{007C6CBA-AACB-4CDB-A9A9-71238355761A}"/>
+              </a:ext>
+            </a:extLst>
+          </p:cNvPr>
+          <p:cNvSpPr>
+            <a:spLocks noGrp="1"/>
+          </p:cNvSpPr>
+          <p:nvPr>
+            <p:ph type="title"/>
+          </p:nvPr>
+        </p:nvSpPr>
+        <p:spPr/>
+        <p:txBody>
+          <a:bodyPr/>
+          <a:lstStyle/>
+          <a:p>
+            <a:endParaRPr lang="zh-CN" altLang="en-US"/>
+          </a:p>
+        </p:txBody>
+      </p:sp>
+      <p:sp>
+        <p:nvSpPr>
+          <p:cNvPr id="3" name="内容占位符 2">
+            <a:extLst>
+              <a:ext uri="{FF2B5EF4-FFF2-40B4-BE49-F238E27FC236}">
+                <a16:creationId xmlns:a16="http://schemas.microsoft.com/office/drawing/2014/main" id="{D536F636-FB92-4D34-8A7D-4701CBD66CB0}"/>
+              </a:ext>
+            </a:extLst>
+          </p:cNvPr>
+          <p:cNvSpPr>
+            <a:spLocks noGrp="1"/>
+          </p:cNvSpPr>
+          <p:nvPr>
+            <p:ph idx="1"/>
+          </p:nvPr>
+        </p:nvSpPr>
+        <p:spPr/>
+        <p:txBody>
+          <a:bodyPr/>
+          <a:lstStyle/>
+          <a:p>
+            <a:endParaRPr lang="zh-CN" altLang="en-US"/>
+          </a:p>
+        </p:txBody>
+      </p:sp>
+    </p:spTree>
+    <p:extLst>
+      <p:ext uri="{BB962C8B-B14F-4D97-AF65-F5344CB8AC3E}">
+        <p14:creationId xmlns:p14="http://schemas.microsoft.com/office/powerpoint/2010/main" val="1440666342"/>
       </p:ext>
     </p:extLst>
   </p:cSld>
@@ -5093,6 +5175,668 @@
 </p:sld>
 </file>
 
+<file path=ppt/slides/slide9.xml><?xml version="1.0" encoding="utf-8"?>
+<p:sld xmlns:a="http://schemas.openxmlformats.org/drawingml/2006/main" xmlns:r="http://schemas.openxmlformats.org/officeDocument/2006/relationships" xmlns:p="http://schemas.openxmlformats.org/presentationml/2006/main">
+  <p:cSld>
+    <p:spTree>
+      <p:nvGrpSpPr>
+        <p:cNvPr id="1" name=""/>
+        <p:cNvGrpSpPr/>
+        <p:nvPr/>
+      </p:nvGrpSpPr>
+      <p:grpSpPr>
+        <a:xfrm>
+          <a:off x="0" y="0"/>
+          <a:ext cx="0" cy="0"/>
+          <a:chOff x="0" y="0"/>
+          <a:chExt cx="0" cy="0"/>
+        </a:xfrm>
+      </p:grpSpPr>
+      <p:pic>
+        <p:nvPicPr>
+          <p:cNvPr id="7" name="图片 6">
+            <a:extLst>
+              <a:ext uri="{FF2B5EF4-FFF2-40B4-BE49-F238E27FC236}">
+                <a16:creationId xmlns:a16="http://schemas.microsoft.com/office/drawing/2014/main" id="{3717CA26-67A5-4BA4-BF8E-C639514CE2BD}"/>
+              </a:ext>
+            </a:extLst>
+          </p:cNvPr>
+          <p:cNvPicPr>
+            <a:picLocks noChangeAspect="1"/>
+          </p:cNvPicPr>
+          <p:nvPr/>
+        </p:nvPicPr>
+        <p:blipFill>
+          <a:blip r:embed="rId2">
+            <a:extLst>
+              <a:ext uri="{28A0092B-C50C-407E-A947-70E740481C1C}">
+                <a14:useLocalDpi xmlns:a14="http://schemas.microsoft.com/office/drawing/2010/main" val="0"/>
+              </a:ext>
+            </a:extLst>
+          </a:blip>
+          <a:stretch>
+            <a:fillRect/>
+          </a:stretch>
+        </p:blipFill>
+        <p:spPr>
+          <a:xfrm>
+            <a:off x="5191819" y="602932"/>
+            <a:ext cx="1625397" cy="2438095"/>
+          </a:xfrm>
+          <a:prstGeom prst="rect">
+            <a:avLst/>
+          </a:prstGeom>
+        </p:spPr>
+      </p:pic>
+      <p:pic>
+        <p:nvPicPr>
+          <p:cNvPr id="9" name="图片 8">
+            <a:extLst>
+              <a:ext uri="{FF2B5EF4-FFF2-40B4-BE49-F238E27FC236}">
+                <a16:creationId xmlns:a16="http://schemas.microsoft.com/office/drawing/2014/main" id="{F637F631-DDBA-42BC-838F-051BB3BC2F18}"/>
+              </a:ext>
+            </a:extLst>
+          </p:cNvPr>
+          <p:cNvPicPr>
+            <a:picLocks noChangeAspect="1"/>
+          </p:cNvPicPr>
+          <p:nvPr/>
+        </p:nvPicPr>
+        <p:blipFill>
+          <a:blip r:embed="rId3">
+            <a:extLst>
+              <a:ext uri="{28A0092B-C50C-407E-A947-70E740481C1C}">
+                <a14:useLocalDpi xmlns:a14="http://schemas.microsoft.com/office/drawing/2010/main" val="0"/>
+              </a:ext>
+            </a:extLst>
+          </a:blip>
+          <a:stretch>
+            <a:fillRect/>
+          </a:stretch>
+        </p:blipFill>
+        <p:spPr>
+          <a:xfrm>
+            <a:off x="8806643" y="912486"/>
+            <a:ext cx="1625397" cy="2438095"/>
+          </a:xfrm>
+          <a:prstGeom prst="rect">
+            <a:avLst/>
+          </a:prstGeom>
+        </p:spPr>
+      </p:pic>
+      <p:pic>
+        <p:nvPicPr>
+          <p:cNvPr id="13" name="图片 12">
+            <a:extLst>
+              <a:ext uri="{FF2B5EF4-FFF2-40B4-BE49-F238E27FC236}">
+                <a16:creationId xmlns:a16="http://schemas.microsoft.com/office/drawing/2014/main" id="{D0617A87-1B3C-408B-8E81-B72522CA7347}"/>
+              </a:ext>
+            </a:extLst>
+          </p:cNvPr>
+          <p:cNvPicPr>
+            <a:picLocks noChangeAspect="1"/>
+          </p:cNvPicPr>
+          <p:nvPr/>
+        </p:nvPicPr>
+        <p:blipFill rotWithShape="1">
+          <a:blip r:embed="rId4">
+            <a:extLst>
+              <a:ext uri="{28A0092B-C50C-407E-A947-70E740481C1C}">
+                <a14:useLocalDpi xmlns:a14="http://schemas.microsoft.com/office/drawing/2010/main" val="0"/>
+              </a:ext>
+            </a:extLst>
+          </a:blip>
+          <a:srcRect r="74276" b="74607"/>
+          <a:stretch/>
+        </p:blipFill>
+        <p:spPr>
+          <a:xfrm>
+            <a:off x="735758" y="577869"/>
+            <a:ext cx="418108" cy="619108"/>
+          </a:xfrm>
+          <a:prstGeom prst="rect">
+            <a:avLst/>
+          </a:prstGeom>
+        </p:spPr>
+      </p:pic>
+      <p:pic>
+        <p:nvPicPr>
+          <p:cNvPr id="14" name="图片 13">
+            <a:extLst>
+              <a:ext uri="{FF2B5EF4-FFF2-40B4-BE49-F238E27FC236}">
+                <a16:creationId xmlns:a16="http://schemas.microsoft.com/office/drawing/2014/main" id="{BA3CFDDC-B25E-4091-9B11-A17D823E6DBA}"/>
+              </a:ext>
+            </a:extLst>
+          </p:cNvPr>
+          <p:cNvPicPr>
+            <a:picLocks noChangeAspect="1"/>
+          </p:cNvPicPr>
+          <p:nvPr/>
+        </p:nvPicPr>
+        <p:blipFill rotWithShape="1">
+          <a:blip r:embed="rId4">
+            <a:extLst>
+              <a:ext uri="{28A0092B-C50C-407E-A947-70E740481C1C}">
+                <a14:useLocalDpi xmlns:a14="http://schemas.microsoft.com/office/drawing/2010/main" val="0"/>
+              </a:ext>
+            </a:extLst>
+          </a:blip>
+          <a:srcRect l="25751" r="48525" b="74607"/>
+          <a:stretch/>
+        </p:blipFill>
+        <p:spPr>
+          <a:xfrm>
+            <a:off x="1221194" y="577869"/>
+            <a:ext cx="418108" cy="619108"/>
+          </a:xfrm>
+          <a:prstGeom prst="rect">
+            <a:avLst/>
+          </a:prstGeom>
+        </p:spPr>
+      </p:pic>
+      <p:pic>
+        <p:nvPicPr>
+          <p:cNvPr id="16" name="图片 15">
+            <a:extLst>
+              <a:ext uri="{FF2B5EF4-FFF2-40B4-BE49-F238E27FC236}">
+                <a16:creationId xmlns:a16="http://schemas.microsoft.com/office/drawing/2014/main" id="{7C951700-5CBD-4917-8627-114CE9556EA8}"/>
+              </a:ext>
+            </a:extLst>
+          </p:cNvPr>
+          <p:cNvPicPr>
+            <a:picLocks noChangeAspect="1"/>
+          </p:cNvPicPr>
+          <p:nvPr/>
+        </p:nvPicPr>
+        <p:blipFill rotWithShape="1">
+          <a:blip r:embed="rId4">
+            <a:extLst>
+              <a:ext uri="{28A0092B-C50C-407E-A947-70E740481C1C}">
+                <a14:useLocalDpi xmlns:a14="http://schemas.microsoft.com/office/drawing/2010/main" val="0"/>
+              </a:ext>
+            </a:extLst>
+          </a:blip>
+          <a:srcRect l="50152" r="24124" b="74607"/>
+          <a:stretch/>
+        </p:blipFill>
+        <p:spPr>
+          <a:xfrm>
+            <a:off x="1759960" y="577869"/>
+            <a:ext cx="418108" cy="619108"/>
+          </a:xfrm>
+          <a:prstGeom prst="rect">
+            <a:avLst/>
+          </a:prstGeom>
+        </p:spPr>
+      </p:pic>
+      <p:pic>
+        <p:nvPicPr>
+          <p:cNvPr id="17" name="图片 16">
+            <a:extLst>
+              <a:ext uri="{FF2B5EF4-FFF2-40B4-BE49-F238E27FC236}">
+                <a16:creationId xmlns:a16="http://schemas.microsoft.com/office/drawing/2014/main" id="{2279515E-0175-4268-9333-6BE0C0CC2778}"/>
+              </a:ext>
+            </a:extLst>
+          </p:cNvPr>
+          <p:cNvPicPr>
+            <a:picLocks noChangeAspect="1"/>
+          </p:cNvPicPr>
+          <p:nvPr/>
+        </p:nvPicPr>
+        <p:blipFill rotWithShape="1">
+          <a:blip r:embed="rId4">
+            <a:extLst>
+              <a:ext uri="{28A0092B-C50C-407E-A947-70E740481C1C}">
+                <a14:useLocalDpi xmlns:a14="http://schemas.microsoft.com/office/drawing/2010/main" val="0"/>
+              </a:ext>
+            </a:extLst>
+          </a:blip>
+          <a:srcRect l="76991" t="176" r="-2715" b="74431"/>
+          <a:stretch/>
+        </p:blipFill>
+        <p:spPr>
+          <a:xfrm>
+            <a:off x="2242946" y="568819"/>
+            <a:ext cx="418108" cy="619108"/>
+          </a:xfrm>
+          <a:prstGeom prst="rect">
+            <a:avLst/>
+          </a:prstGeom>
+        </p:spPr>
+      </p:pic>
+      <p:pic>
+        <p:nvPicPr>
+          <p:cNvPr id="19" name="图片 18">
+            <a:extLst>
+              <a:ext uri="{FF2B5EF4-FFF2-40B4-BE49-F238E27FC236}">
+                <a16:creationId xmlns:a16="http://schemas.microsoft.com/office/drawing/2014/main" id="{A650B273-1E5A-4879-9ED0-8CD032561C69}"/>
+              </a:ext>
+            </a:extLst>
+          </p:cNvPr>
+          <p:cNvPicPr>
+            <a:picLocks noChangeAspect="1"/>
+          </p:cNvPicPr>
+          <p:nvPr/>
+        </p:nvPicPr>
+        <p:blipFill rotWithShape="1">
+          <a:blip r:embed="rId4">
+            <a:extLst>
+              <a:ext uri="{28A0092B-C50C-407E-A947-70E740481C1C}">
+                <a14:useLocalDpi xmlns:a14="http://schemas.microsoft.com/office/drawing/2010/main" val="0"/>
+              </a:ext>
+            </a:extLst>
+          </a:blip>
+          <a:srcRect l="1187" t="25393" r="73089" b="49214"/>
+          <a:stretch/>
+        </p:blipFill>
+        <p:spPr>
+          <a:xfrm>
+            <a:off x="737423" y="1512426"/>
+            <a:ext cx="418108" cy="619108"/>
+          </a:xfrm>
+          <a:prstGeom prst="rect">
+            <a:avLst/>
+          </a:prstGeom>
+        </p:spPr>
+      </p:pic>
+      <p:pic>
+        <p:nvPicPr>
+          <p:cNvPr id="20" name="图片 19">
+            <a:extLst>
+              <a:ext uri="{FF2B5EF4-FFF2-40B4-BE49-F238E27FC236}">
+                <a16:creationId xmlns:a16="http://schemas.microsoft.com/office/drawing/2014/main" id="{BD09A14C-AED1-4443-9D67-252DEB1BE045}"/>
+              </a:ext>
+            </a:extLst>
+          </p:cNvPr>
+          <p:cNvPicPr>
+            <a:picLocks noChangeAspect="1"/>
+          </p:cNvPicPr>
+          <p:nvPr/>
+        </p:nvPicPr>
+        <p:blipFill rotWithShape="1">
+          <a:blip r:embed="rId4">
+            <a:extLst>
+              <a:ext uri="{28A0092B-C50C-407E-A947-70E740481C1C}">
+                <a14:useLocalDpi xmlns:a14="http://schemas.microsoft.com/office/drawing/2010/main" val="0"/>
+              </a:ext>
+            </a:extLst>
+          </a:blip>
+          <a:srcRect l="26148" t="25393" r="48128" b="49214"/>
+          <a:stretch/>
+        </p:blipFill>
+        <p:spPr>
+          <a:xfrm>
+            <a:off x="1220381" y="1512426"/>
+            <a:ext cx="418108" cy="619108"/>
+          </a:xfrm>
+          <a:prstGeom prst="rect">
+            <a:avLst/>
+          </a:prstGeom>
+        </p:spPr>
+      </p:pic>
+      <p:pic>
+        <p:nvPicPr>
+          <p:cNvPr id="21" name="图片 20">
+            <a:extLst>
+              <a:ext uri="{FF2B5EF4-FFF2-40B4-BE49-F238E27FC236}">
+                <a16:creationId xmlns:a16="http://schemas.microsoft.com/office/drawing/2014/main" id="{399B4E79-3A2C-4F36-86D2-95BFE821AD6C}"/>
+              </a:ext>
+            </a:extLst>
+          </p:cNvPr>
+          <p:cNvPicPr>
+            <a:picLocks noChangeAspect="1"/>
+          </p:cNvPicPr>
+          <p:nvPr/>
+        </p:nvPicPr>
+        <p:blipFill rotWithShape="1">
+          <a:blip r:embed="rId4">
+            <a:extLst>
+              <a:ext uri="{28A0092B-C50C-407E-A947-70E740481C1C}">
+                <a14:useLocalDpi xmlns:a14="http://schemas.microsoft.com/office/drawing/2010/main" val="0"/>
+              </a:ext>
+            </a:extLst>
+          </a:blip>
+          <a:srcRect l="50683" t="25393" r="23593" b="49214"/>
+          <a:stretch/>
+        </p:blipFill>
+        <p:spPr>
+          <a:xfrm>
+            <a:off x="1703339" y="1512426"/>
+            <a:ext cx="418108" cy="619108"/>
+          </a:xfrm>
+          <a:prstGeom prst="rect">
+            <a:avLst/>
+          </a:prstGeom>
+        </p:spPr>
+      </p:pic>
+      <p:pic>
+        <p:nvPicPr>
+          <p:cNvPr id="22" name="图片 21">
+            <a:extLst>
+              <a:ext uri="{FF2B5EF4-FFF2-40B4-BE49-F238E27FC236}">
+                <a16:creationId xmlns:a16="http://schemas.microsoft.com/office/drawing/2014/main" id="{A32E9D72-ACF8-462E-9C8B-C8D1CCB7CF10}"/>
+              </a:ext>
+            </a:extLst>
+          </p:cNvPr>
+          <p:cNvPicPr>
+            <a:picLocks noChangeAspect="1"/>
+          </p:cNvPicPr>
+          <p:nvPr/>
+        </p:nvPicPr>
+        <p:blipFill rotWithShape="1">
+          <a:blip r:embed="rId4">
+            <a:extLst>
+              <a:ext uri="{28A0092B-C50C-407E-A947-70E740481C1C}">
+                <a14:useLocalDpi xmlns:a14="http://schemas.microsoft.com/office/drawing/2010/main" val="0"/>
+              </a:ext>
+            </a:extLst>
+          </a:blip>
+          <a:srcRect l="75724" t="25393" r="-1448" b="49214"/>
+          <a:stretch/>
+        </p:blipFill>
+        <p:spPr>
+          <a:xfrm>
+            <a:off x="2121447" y="1512426"/>
+            <a:ext cx="418108" cy="619108"/>
+          </a:xfrm>
+          <a:prstGeom prst="rect">
+            <a:avLst/>
+          </a:prstGeom>
+        </p:spPr>
+      </p:pic>
+      <p:pic>
+        <p:nvPicPr>
+          <p:cNvPr id="23" name="图片 22">
+            <a:extLst>
+              <a:ext uri="{FF2B5EF4-FFF2-40B4-BE49-F238E27FC236}">
+                <a16:creationId xmlns:a16="http://schemas.microsoft.com/office/drawing/2014/main" id="{1DCAFDDD-B22A-446E-8BD5-5874B49982D6}"/>
+              </a:ext>
+            </a:extLst>
+          </p:cNvPr>
+          <p:cNvPicPr>
+            <a:picLocks noChangeAspect="1"/>
+          </p:cNvPicPr>
+          <p:nvPr/>
+        </p:nvPicPr>
+        <p:blipFill rotWithShape="1">
+          <a:blip r:embed="rId4">
+            <a:extLst>
+              <a:ext uri="{28A0092B-C50C-407E-A947-70E740481C1C}">
+                <a14:useLocalDpi xmlns:a14="http://schemas.microsoft.com/office/drawing/2010/main" val="0"/>
+              </a:ext>
+            </a:extLst>
+          </a:blip>
+          <a:srcRect l="-2377" t="50000" r="76653" b="24607"/>
+          <a:stretch/>
+        </p:blipFill>
+        <p:spPr>
+          <a:xfrm>
+            <a:off x="735758" y="2346753"/>
+            <a:ext cx="418108" cy="619108"/>
+          </a:xfrm>
+          <a:prstGeom prst="rect">
+            <a:avLst/>
+          </a:prstGeom>
+        </p:spPr>
+      </p:pic>
+      <p:pic>
+        <p:nvPicPr>
+          <p:cNvPr id="25" name="图片 24">
+            <a:extLst>
+              <a:ext uri="{FF2B5EF4-FFF2-40B4-BE49-F238E27FC236}">
+                <a16:creationId xmlns:a16="http://schemas.microsoft.com/office/drawing/2014/main" id="{B2FD5BBE-FA67-4F8D-93D0-D5790AB50CB3}"/>
+              </a:ext>
+            </a:extLst>
+          </p:cNvPr>
+          <p:cNvPicPr>
+            <a:picLocks noChangeAspect="1"/>
+          </p:cNvPicPr>
+          <p:nvPr/>
+        </p:nvPicPr>
+        <p:blipFill rotWithShape="1">
+          <a:blip r:embed="rId4">
+            <a:extLst>
+              <a:ext uri="{28A0092B-C50C-407E-A947-70E740481C1C}">
+                <a14:useLocalDpi xmlns:a14="http://schemas.microsoft.com/office/drawing/2010/main" val="0"/>
+              </a:ext>
+            </a:extLst>
+          </a:blip>
+          <a:srcRect l="23687" t="50000" r="50589" b="24607"/>
+          <a:stretch/>
+        </p:blipFill>
+        <p:spPr>
+          <a:xfrm>
+            <a:off x="1153866" y="2346753"/>
+            <a:ext cx="418108" cy="619108"/>
+          </a:xfrm>
+          <a:prstGeom prst="rect">
+            <a:avLst/>
+          </a:prstGeom>
+        </p:spPr>
+      </p:pic>
+      <p:pic>
+        <p:nvPicPr>
+          <p:cNvPr id="26" name="图片 25">
+            <a:extLst>
+              <a:ext uri="{FF2B5EF4-FFF2-40B4-BE49-F238E27FC236}">
+                <a16:creationId xmlns:a16="http://schemas.microsoft.com/office/drawing/2014/main" id="{492660ED-7140-4698-9753-48C121A8BC21}"/>
+              </a:ext>
+            </a:extLst>
+          </p:cNvPr>
+          <p:cNvPicPr>
+            <a:picLocks noChangeAspect="1"/>
+          </p:cNvPicPr>
+          <p:nvPr/>
+        </p:nvPicPr>
+        <p:blipFill rotWithShape="1">
+          <a:blip r:embed="rId4">
+            <a:extLst>
+              <a:ext uri="{28A0092B-C50C-407E-A947-70E740481C1C}">
+                <a14:useLocalDpi xmlns:a14="http://schemas.microsoft.com/office/drawing/2010/main" val="0"/>
+              </a:ext>
+            </a:extLst>
+          </a:blip>
+          <a:srcRect l="47542" t="50000" r="26734" b="24607"/>
+          <a:stretch/>
+        </p:blipFill>
+        <p:spPr>
+          <a:xfrm>
+            <a:off x="1571974" y="2346752"/>
+            <a:ext cx="418108" cy="619108"/>
+          </a:xfrm>
+          <a:prstGeom prst="rect">
+            <a:avLst/>
+          </a:prstGeom>
+        </p:spPr>
+      </p:pic>
+      <p:pic>
+        <p:nvPicPr>
+          <p:cNvPr id="27" name="图片 26">
+            <a:extLst>
+              <a:ext uri="{FF2B5EF4-FFF2-40B4-BE49-F238E27FC236}">
+                <a16:creationId xmlns:a16="http://schemas.microsoft.com/office/drawing/2014/main" id="{BAB343DE-9AE1-4CF5-B18F-26EF6198D435}"/>
+              </a:ext>
+            </a:extLst>
+          </p:cNvPr>
+          <p:cNvPicPr>
+            <a:picLocks noChangeAspect="1"/>
+          </p:cNvPicPr>
+          <p:nvPr/>
+        </p:nvPicPr>
+        <p:blipFill rotWithShape="1">
+          <a:blip r:embed="rId4">
+            <a:extLst>
+              <a:ext uri="{28A0092B-C50C-407E-A947-70E740481C1C}">
+                <a14:useLocalDpi xmlns:a14="http://schemas.microsoft.com/office/drawing/2010/main" val="0"/>
+              </a:ext>
+            </a:extLst>
+          </a:blip>
+          <a:srcRect l="72374" t="50000" r="1902" b="24607"/>
+          <a:stretch/>
+        </p:blipFill>
+        <p:spPr>
+          <a:xfrm>
+            <a:off x="1965625" y="2346752"/>
+            <a:ext cx="418108" cy="619108"/>
+          </a:xfrm>
+          <a:prstGeom prst="rect">
+            <a:avLst/>
+          </a:prstGeom>
+        </p:spPr>
+      </p:pic>
+      <p:pic>
+        <p:nvPicPr>
+          <p:cNvPr id="28" name="图片 27">
+            <a:extLst>
+              <a:ext uri="{FF2B5EF4-FFF2-40B4-BE49-F238E27FC236}">
+                <a16:creationId xmlns:a16="http://schemas.microsoft.com/office/drawing/2014/main" id="{6BF113CB-5C7D-4B42-8D95-272186E6FC69}"/>
+              </a:ext>
+            </a:extLst>
+          </p:cNvPr>
+          <p:cNvPicPr>
+            <a:picLocks noChangeAspect="1"/>
+          </p:cNvPicPr>
+          <p:nvPr/>
+        </p:nvPicPr>
+        <p:blipFill rotWithShape="1">
+          <a:blip r:embed="rId4">
+            <a:extLst>
+              <a:ext uri="{28A0092B-C50C-407E-A947-70E740481C1C}">
+                <a14:useLocalDpi xmlns:a14="http://schemas.microsoft.com/office/drawing/2010/main" val="0"/>
+              </a:ext>
+            </a:extLst>
+          </a:blip>
+          <a:srcRect l="-1076" t="74607" r="75352"/>
+          <a:stretch/>
+        </p:blipFill>
+        <p:spPr>
+          <a:xfrm>
+            <a:off x="693947" y="3181079"/>
+            <a:ext cx="418108" cy="619108"/>
+          </a:xfrm>
+          <a:prstGeom prst="rect">
+            <a:avLst/>
+          </a:prstGeom>
+        </p:spPr>
+      </p:pic>
+      <p:pic>
+        <p:nvPicPr>
+          <p:cNvPr id="29" name="图片 28">
+            <a:extLst>
+              <a:ext uri="{FF2B5EF4-FFF2-40B4-BE49-F238E27FC236}">
+                <a16:creationId xmlns:a16="http://schemas.microsoft.com/office/drawing/2014/main" id="{07EADC9A-308B-4524-922A-E7F286B61A86}"/>
+              </a:ext>
+            </a:extLst>
+          </p:cNvPr>
+          <p:cNvPicPr>
+            <a:picLocks noChangeAspect="1"/>
+          </p:cNvPicPr>
+          <p:nvPr/>
+        </p:nvPicPr>
+        <p:blipFill rotWithShape="1">
+          <a:blip r:embed="rId4">
+            <a:extLst>
+              <a:ext uri="{28A0092B-C50C-407E-A947-70E740481C1C}">
+                <a14:useLocalDpi xmlns:a14="http://schemas.microsoft.com/office/drawing/2010/main" val="0"/>
+              </a:ext>
+            </a:extLst>
+          </a:blip>
+          <a:srcRect l="24647" t="74607" r="49629"/>
+          <a:stretch/>
+        </p:blipFill>
+        <p:spPr>
+          <a:xfrm>
+            <a:off x="1112055" y="3181078"/>
+            <a:ext cx="418108" cy="619108"/>
+          </a:xfrm>
+          <a:prstGeom prst="rect">
+            <a:avLst/>
+          </a:prstGeom>
+        </p:spPr>
+      </p:pic>
+      <p:pic>
+        <p:nvPicPr>
+          <p:cNvPr id="30" name="图片 29">
+            <a:extLst>
+              <a:ext uri="{FF2B5EF4-FFF2-40B4-BE49-F238E27FC236}">
+                <a16:creationId xmlns:a16="http://schemas.microsoft.com/office/drawing/2014/main" id="{36D719C5-DDA3-447A-8E93-999465FFE484}"/>
+              </a:ext>
+            </a:extLst>
+          </p:cNvPr>
+          <p:cNvPicPr>
+            <a:picLocks noChangeAspect="1"/>
+          </p:cNvPicPr>
+          <p:nvPr/>
+        </p:nvPicPr>
+        <p:blipFill rotWithShape="1">
+          <a:blip r:embed="rId4">
+            <a:extLst>
+              <a:ext uri="{28A0092B-C50C-407E-A947-70E740481C1C}">
+                <a14:useLocalDpi xmlns:a14="http://schemas.microsoft.com/office/drawing/2010/main" val="0"/>
+              </a:ext>
+            </a:extLst>
+          </a:blip>
+          <a:srcRect l="50214" t="74466" r="24062" b="141"/>
+          <a:stretch/>
+        </p:blipFill>
+        <p:spPr>
+          <a:xfrm>
+            <a:off x="1559368" y="3181078"/>
+            <a:ext cx="418108" cy="619108"/>
+          </a:xfrm>
+          <a:prstGeom prst="rect">
+            <a:avLst/>
+          </a:prstGeom>
+        </p:spPr>
+      </p:pic>
+      <p:pic>
+        <p:nvPicPr>
+          <p:cNvPr id="31" name="图片 30">
+            <a:extLst>
+              <a:ext uri="{FF2B5EF4-FFF2-40B4-BE49-F238E27FC236}">
+                <a16:creationId xmlns:a16="http://schemas.microsoft.com/office/drawing/2014/main" id="{ACD092CC-3633-4AD3-8918-DC4651B1D56D}"/>
+              </a:ext>
+            </a:extLst>
+          </p:cNvPr>
+          <p:cNvPicPr>
+            <a:picLocks noChangeAspect="1"/>
+          </p:cNvPicPr>
+          <p:nvPr/>
+        </p:nvPicPr>
+        <p:blipFill rotWithShape="1">
+          <a:blip r:embed="rId4">
+            <a:extLst>
+              <a:ext uri="{28A0092B-C50C-407E-A947-70E740481C1C}">
+                <a14:useLocalDpi xmlns:a14="http://schemas.microsoft.com/office/drawing/2010/main" val="0"/>
+              </a:ext>
+            </a:extLst>
+          </a:blip>
+          <a:srcRect l="73888" t="74607" r="388"/>
+          <a:stretch/>
+        </p:blipFill>
+        <p:spPr>
+          <a:xfrm>
+            <a:off x="1912393" y="3181078"/>
+            <a:ext cx="418108" cy="619108"/>
+          </a:xfrm>
+          <a:prstGeom prst="rect">
+            <a:avLst/>
+          </a:prstGeom>
+        </p:spPr>
+      </p:pic>
+    </p:spTree>
+    <p:extLst>
+      <p:ext uri="{BB962C8B-B14F-4D97-AF65-F5344CB8AC3E}">
+        <p14:creationId xmlns:p14="http://schemas.microsoft.com/office/powerpoint/2010/main" val="777003875"/>
+      </p:ext>
+    </p:extLst>
+  </p:cSld>
+  <p:clrMapOvr>
+    <a:masterClrMapping/>
+  </p:clrMapOvr>
+</p:sld>
+</file>
+
 <file path=ppt/theme/theme1.xml><?xml version="1.0" encoding="utf-8"?>
 <a:theme xmlns:a="http://schemas.openxmlformats.org/drawingml/2006/main" name="Office 主题​​">
   <a:themeElements>

</xml_diff>

<commit_message>
A lot of hardwork
Draw and update pictures of menu.py;
Draw a map for menu.py;
The interface has been enabled in fight.py.
</commit_message>
<xml_diff>
--- a/Pictures/草稿纸.pptx
+++ b/Pictures/草稿纸.pptx
@@ -15,6 +15,7 @@
     <p:sldId id="263" r:id="rId9"/>
     <p:sldId id="264" r:id="rId10"/>
     <p:sldId id="265" r:id="rId11"/>
+    <p:sldId id="266" r:id="rId12"/>
   </p:sldIdLst>
   <p:sldSz cx="12192000" cy="6858000"/>
   <p:notesSz cx="6858000" cy="9144000"/>
@@ -4568,10 +4569,2676 @@
           </a:prstGeom>
         </p:spPr>
       </p:pic>
+      <p:pic>
+        <p:nvPicPr>
+          <p:cNvPr id="37" name="图片 36">
+            <a:extLst>
+              <a:ext uri="{FF2B5EF4-FFF2-40B4-BE49-F238E27FC236}">
+                <a16:creationId xmlns:a16="http://schemas.microsoft.com/office/drawing/2014/main" id="{791E267E-29CB-4081-B607-72735185BF28}"/>
+              </a:ext>
+            </a:extLst>
+          </p:cNvPr>
+          <p:cNvPicPr>
+            <a:picLocks noChangeAspect="1"/>
+          </p:cNvPicPr>
+          <p:nvPr/>
+        </p:nvPicPr>
+        <p:blipFill rotWithShape="1">
+          <a:blip r:embed="rId4">
+            <a:extLst>
+              <a:ext uri="{28A0092B-C50C-407E-A947-70E740481C1C}">
+                <a14:useLocalDpi xmlns:a14="http://schemas.microsoft.com/office/drawing/2010/main" val="0"/>
+              </a:ext>
+            </a:extLst>
+          </a:blip>
+          <a:srcRect l="3484" t="9602" r="88330" b="81545"/>
+          <a:stretch/>
+        </p:blipFill>
+        <p:spPr>
+          <a:xfrm>
+            <a:off x="8182588" y="4973995"/>
+            <a:ext cx="676908" cy="788400"/>
+          </a:xfrm>
+          <a:prstGeom prst="rect">
+            <a:avLst/>
+          </a:prstGeom>
+        </p:spPr>
+      </p:pic>
     </p:spTree>
     <p:extLst>
       <p:ext uri="{BB962C8B-B14F-4D97-AF65-F5344CB8AC3E}">
         <p14:creationId xmlns:p14="http://schemas.microsoft.com/office/powerpoint/2010/main" val="1440666342"/>
+      </p:ext>
+    </p:extLst>
+  </p:cSld>
+  <p:clrMapOvr>
+    <a:masterClrMapping/>
+  </p:clrMapOvr>
+</p:sld>
+</file>
+
+<file path=ppt/slides/slide11.xml><?xml version="1.0" encoding="utf-8"?>
+<p:sld xmlns:a="http://schemas.openxmlformats.org/drawingml/2006/main" xmlns:r="http://schemas.openxmlformats.org/officeDocument/2006/relationships" xmlns:p="http://schemas.openxmlformats.org/presentationml/2006/main">
+  <p:cSld>
+    <p:spTree>
+      <p:nvGrpSpPr>
+        <p:cNvPr id="1" name=""/>
+        <p:cNvGrpSpPr/>
+        <p:nvPr/>
+      </p:nvGrpSpPr>
+      <p:grpSpPr>
+        <a:xfrm>
+          <a:off x="0" y="0"/>
+          <a:ext cx="0" cy="0"/>
+          <a:chOff x="0" y="0"/>
+          <a:chExt cx="0" cy="0"/>
+        </a:xfrm>
+      </p:grpSpPr>
+      <p:pic>
+        <p:nvPicPr>
+          <p:cNvPr id="18" name="图片 17">
+            <a:extLst>
+              <a:ext uri="{FF2B5EF4-FFF2-40B4-BE49-F238E27FC236}">
+                <a16:creationId xmlns:a16="http://schemas.microsoft.com/office/drawing/2014/main" id="{3AF8EB83-D7FA-49CF-B2AA-22777CBF74FD}"/>
+              </a:ext>
+            </a:extLst>
+          </p:cNvPr>
+          <p:cNvPicPr>
+            <a:picLocks noChangeAspect="1"/>
+          </p:cNvPicPr>
+          <p:nvPr/>
+        </p:nvPicPr>
+        <p:blipFill rotWithShape="1">
+          <a:blip r:embed="rId2">
+            <a:extLst>
+              <a:ext uri="{28A0092B-C50C-407E-A947-70E740481C1C}">
+                <a14:useLocalDpi xmlns:a14="http://schemas.microsoft.com/office/drawing/2010/main" val="0"/>
+              </a:ext>
+            </a:extLst>
+          </a:blip>
+          <a:srcRect l="9209" t="648" r="21190" b="1141"/>
+          <a:stretch/>
+        </p:blipFill>
+        <p:spPr>
+          <a:xfrm>
+            <a:off x="-855238" y="0"/>
+            <a:ext cx="8601721" cy="6827520"/>
+          </a:xfrm>
+          <a:prstGeom prst="rect">
+            <a:avLst/>
+          </a:prstGeom>
+        </p:spPr>
+      </p:pic>
+      <p:pic>
+        <p:nvPicPr>
+          <p:cNvPr id="21" name="图片 20">
+            <a:extLst>
+              <a:ext uri="{FF2B5EF4-FFF2-40B4-BE49-F238E27FC236}">
+                <a16:creationId xmlns:a16="http://schemas.microsoft.com/office/drawing/2014/main" id="{5BE34BE5-E363-4044-80C6-8D227D01F41B}"/>
+              </a:ext>
+            </a:extLst>
+          </p:cNvPr>
+          <p:cNvPicPr>
+            <a:picLocks noChangeAspect="1"/>
+          </p:cNvPicPr>
+          <p:nvPr/>
+        </p:nvPicPr>
+        <p:blipFill>
+          <a:blip r:embed="rId3">
+            <a:extLst>
+              <a:ext uri="{28A0092B-C50C-407E-A947-70E740481C1C}">
+                <a14:useLocalDpi xmlns:a14="http://schemas.microsoft.com/office/drawing/2010/main" val="0"/>
+              </a:ext>
+            </a:extLst>
+          </a:blip>
+          <a:stretch>
+            <a:fillRect/>
+          </a:stretch>
+        </p:blipFill>
+        <p:spPr>
+          <a:xfrm>
+            <a:off x="4306521" y="-12192"/>
+            <a:ext cx="573327" cy="573327"/>
+          </a:xfrm>
+          <a:prstGeom prst="rect">
+            <a:avLst/>
+          </a:prstGeom>
+        </p:spPr>
+      </p:pic>
+      <p:pic>
+        <p:nvPicPr>
+          <p:cNvPr id="22" name="图片 21">
+            <a:extLst>
+              <a:ext uri="{FF2B5EF4-FFF2-40B4-BE49-F238E27FC236}">
+                <a16:creationId xmlns:a16="http://schemas.microsoft.com/office/drawing/2014/main" id="{CCE1EC86-380A-438E-A143-D2261ECE775E}"/>
+              </a:ext>
+            </a:extLst>
+          </p:cNvPr>
+          <p:cNvPicPr>
+            <a:picLocks noChangeAspect="1"/>
+          </p:cNvPicPr>
+          <p:nvPr/>
+        </p:nvPicPr>
+        <p:blipFill>
+          <a:blip r:embed="rId3">
+            <a:extLst>
+              <a:ext uri="{28A0092B-C50C-407E-A947-70E740481C1C}">
+                <a14:useLocalDpi xmlns:a14="http://schemas.microsoft.com/office/drawing/2010/main" val="0"/>
+              </a:ext>
+            </a:extLst>
+          </a:blip>
+          <a:stretch>
+            <a:fillRect/>
+          </a:stretch>
+        </p:blipFill>
+        <p:spPr>
+          <a:xfrm>
+            <a:off x="4879848" y="-12193"/>
+            <a:ext cx="573327" cy="573327"/>
+          </a:xfrm>
+          <a:prstGeom prst="rect">
+            <a:avLst/>
+          </a:prstGeom>
+        </p:spPr>
+      </p:pic>
+      <p:pic>
+        <p:nvPicPr>
+          <p:cNvPr id="23" name="图片 22">
+            <a:extLst>
+              <a:ext uri="{FF2B5EF4-FFF2-40B4-BE49-F238E27FC236}">
+                <a16:creationId xmlns:a16="http://schemas.microsoft.com/office/drawing/2014/main" id="{6276950D-AD8F-496A-B717-BA184292D940}"/>
+              </a:ext>
+            </a:extLst>
+          </p:cNvPr>
+          <p:cNvPicPr>
+            <a:picLocks noChangeAspect="1"/>
+          </p:cNvPicPr>
+          <p:nvPr/>
+        </p:nvPicPr>
+        <p:blipFill>
+          <a:blip r:embed="rId3">
+            <a:extLst>
+              <a:ext uri="{28A0092B-C50C-407E-A947-70E740481C1C}">
+                <a14:useLocalDpi xmlns:a14="http://schemas.microsoft.com/office/drawing/2010/main" val="0"/>
+              </a:ext>
+            </a:extLst>
+          </a:blip>
+          <a:stretch>
+            <a:fillRect/>
+          </a:stretch>
+        </p:blipFill>
+        <p:spPr>
+          <a:xfrm>
+            <a:off x="5453175" y="-12193"/>
+            <a:ext cx="573327" cy="573327"/>
+          </a:xfrm>
+          <a:prstGeom prst="rect">
+            <a:avLst/>
+          </a:prstGeom>
+        </p:spPr>
+      </p:pic>
+      <p:pic>
+        <p:nvPicPr>
+          <p:cNvPr id="24" name="图片 23">
+            <a:extLst>
+              <a:ext uri="{FF2B5EF4-FFF2-40B4-BE49-F238E27FC236}">
+                <a16:creationId xmlns:a16="http://schemas.microsoft.com/office/drawing/2014/main" id="{B8D6FA0A-C093-42E3-AE70-6F5CC1C99604}"/>
+              </a:ext>
+            </a:extLst>
+          </p:cNvPr>
+          <p:cNvPicPr>
+            <a:picLocks noChangeAspect="1"/>
+          </p:cNvPicPr>
+          <p:nvPr/>
+        </p:nvPicPr>
+        <p:blipFill>
+          <a:blip r:embed="rId3">
+            <a:extLst>
+              <a:ext uri="{28A0092B-C50C-407E-A947-70E740481C1C}">
+                <a14:useLocalDpi xmlns:a14="http://schemas.microsoft.com/office/drawing/2010/main" val="0"/>
+              </a:ext>
+            </a:extLst>
+          </a:blip>
+          <a:stretch>
+            <a:fillRect/>
+          </a:stretch>
+        </p:blipFill>
+        <p:spPr>
+          <a:xfrm>
+            <a:off x="4306521" y="561135"/>
+            <a:ext cx="573327" cy="573327"/>
+          </a:xfrm>
+          <a:prstGeom prst="rect">
+            <a:avLst/>
+          </a:prstGeom>
+        </p:spPr>
+      </p:pic>
+      <p:pic>
+        <p:nvPicPr>
+          <p:cNvPr id="25" name="图片 24">
+            <a:extLst>
+              <a:ext uri="{FF2B5EF4-FFF2-40B4-BE49-F238E27FC236}">
+                <a16:creationId xmlns:a16="http://schemas.microsoft.com/office/drawing/2014/main" id="{DE182197-5C9D-45CF-B164-295A0C018249}"/>
+              </a:ext>
+            </a:extLst>
+          </p:cNvPr>
+          <p:cNvPicPr>
+            <a:picLocks noChangeAspect="1"/>
+          </p:cNvPicPr>
+          <p:nvPr/>
+        </p:nvPicPr>
+        <p:blipFill>
+          <a:blip r:embed="rId3">
+            <a:extLst>
+              <a:ext uri="{28A0092B-C50C-407E-A947-70E740481C1C}">
+                <a14:useLocalDpi xmlns:a14="http://schemas.microsoft.com/office/drawing/2010/main" val="0"/>
+              </a:ext>
+            </a:extLst>
+          </a:blip>
+          <a:stretch>
+            <a:fillRect/>
+          </a:stretch>
+        </p:blipFill>
+        <p:spPr>
+          <a:xfrm>
+            <a:off x="4879848" y="561134"/>
+            <a:ext cx="573327" cy="573327"/>
+          </a:xfrm>
+          <a:prstGeom prst="rect">
+            <a:avLst/>
+          </a:prstGeom>
+        </p:spPr>
+      </p:pic>
+      <p:pic>
+        <p:nvPicPr>
+          <p:cNvPr id="26" name="图片 25">
+            <a:extLst>
+              <a:ext uri="{FF2B5EF4-FFF2-40B4-BE49-F238E27FC236}">
+                <a16:creationId xmlns:a16="http://schemas.microsoft.com/office/drawing/2014/main" id="{9B3CAF16-BAF8-4658-B915-1C768C527A28}"/>
+              </a:ext>
+            </a:extLst>
+          </p:cNvPr>
+          <p:cNvPicPr>
+            <a:picLocks noChangeAspect="1"/>
+          </p:cNvPicPr>
+          <p:nvPr/>
+        </p:nvPicPr>
+        <p:blipFill>
+          <a:blip r:embed="rId3">
+            <a:extLst>
+              <a:ext uri="{28A0092B-C50C-407E-A947-70E740481C1C}">
+                <a14:useLocalDpi xmlns:a14="http://schemas.microsoft.com/office/drawing/2010/main" val="0"/>
+              </a:ext>
+            </a:extLst>
+          </a:blip>
+          <a:stretch>
+            <a:fillRect/>
+          </a:stretch>
+        </p:blipFill>
+        <p:spPr>
+          <a:xfrm>
+            <a:off x="5453175" y="561134"/>
+            <a:ext cx="573327" cy="573327"/>
+          </a:xfrm>
+          <a:prstGeom prst="rect">
+            <a:avLst/>
+          </a:prstGeom>
+        </p:spPr>
+      </p:pic>
+      <p:pic>
+        <p:nvPicPr>
+          <p:cNvPr id="16" name="图片 15">
+            <a:extLst>
+              <a:ext uri="{FF2B5EF4-FFF2-40B4-BE49-F238E27FC236}">
+                <a16:creationId xmlns:a16="http://schemas.microsoft.com/office/drawing/2014/main" id="{98FFAB3D-3BC5-4F7C-885E-CD65317CB67C}"/>
+              </a:ext>
+            </a:extLst>
+          </p:cNvPr>
+          <p:cNvPicPr>
+            <a:picLocks noChangeAspect="1"/>
+          </p:cNvPicPr>
+          <p:nvPr/>
+        </p:nvPicPr>
+        <p:blipFill>
+          <a:blip r:embed="rId4">
+            <a:extLst>
+              <a:ext uri="{28A0092B-C50C-407E-A947-70E740481C1C}">
+                <a14:useLocalDpi xmlns:a14="http://schemas.microsoft.com/office/drawing/2010/main" val="0"/>
+              </a:ext>
+            </a:extLst>
+          </a:blip>
+          <a:stretch>
+            <a:fillRect/>
+          </a:stretch>
+        </p:blipFill>
+        <p:spPr>
+          <a:xfrm>
+            <a:off x="4507557" y="73347"/>
+            <a:ext cx="1268914" cy="933960"/>
+          </a:xfrm>
+          <a:prstGeom prst="rect">
+            <a:avLst/>
+          </a:prstGeom>
+        </p:spPr>
+      </p:pic>
+      <p:pic>
+        <p:nvPicPr>
+          <p:cNvPr id="27" name="图片 26">
+            <a:extLst>
+              <a:ext uri="{FF2B5EF4-FFF2-40B4-BE49-F238E27FC236}">
+                <a16:creationId xmlns:a16="http://schemas.microsoft.com/office/drawing/2014/main" id="{BD0F7642-888A-4452-AB5B-134AB7ACB997}"/>
+              </a:ext>
+            </a:extLst>
+          </p:cNvPr>
+          <p:cNvPicPr>
+            <a:picLocks noChangeAspect="1"/>
+          </p:cNvPicPr>
+          <p:nvPr/>
+        </p:nvPicPr>
+        <p:blipFill>
+          <a:blip r:embed="rId3">
+            <a:extLst>
+              <a:ext uri="{28A0092B-C50C-407E-A947-70E740481C1C}">
+                <a14:useLocalDpi xmlns:a14="http://schemas.microsoft.com/office/drawing/2010/main" val="0"/>
+              </a:ext>
+            </a:extLst>
+          </a:blip>
+          <a:stretch>
+            <a:fillRect/>
+          </a:stretch>
+        </p:blipFill>
+        <p:spPr>
+          <a:xfrm>
+            <a:off x="2586540" y="-12192"/>
+            <a:ext cx="573327" cy="573327"/>
+          </a:xfrm>
+          <a:prstGeom prst="rect">
+            <a:avLst/>
+          </a:prstGeom>
+        </p:spPr>
+      </p:pic>
+      <p:pic>
+        <p:nvPicPr>
+          <p:cNvPr id="28" name="图片 27">
+            <a:extLst>
+              <a:ext uri="{FF2B5EF4-FFF2-40B4-BE49-F238E27FC236}">
+                <a16:creationId xmlns:a16="http://schemas.microsoft.com/office/drawing/2014/main" id="{97BA0990-B2C7-4F36-94E1-5E3A161C55B4}"/>
+              </a:ext>
+            </a:extLst>
+          </p:cNvPr>
+          <p:cNvPicPr>
+            <a:picLocks noChangeAspect="1"/>
+          </p:cNvPicPr>
+          <p:nvPr/>
+        </p:nvPicPr>
+        <p:blipFill>
+          <a:blip r:embed="rId3">
+            <a:extLst>
+              <a:ext uri="{28A0092B-C50C-407E-A947-70E740481C1C}">
+                <a14:useLocalDpi xmlns:a14="http://schemas.microsoft.com/office/drawing/2010/main" val="0"/>
+              </a:ext>
+            </a:extLst>
+          </a:blip>
+          <a:stretch>
+            <a:fillRect/>
+          </a:stretch>
+        </p:blipFill>
+        <p:spPr>
+          <a:xfrm>
+            <a:off x="3159867" y="-12193"/>
+            <a:ext cx="573327" cy="573327"/>
+          </a:xfrm>
+          <a:prstGeom prst="rect">
+            <a:avLst/>
+          </a:prstGeom>
+        </p:spPr>
+      </p:pic>
+      <p:pic>
+        <p:nvPicPr>
+          <p:cNvPr id="29" name="图片 28">
+            <a:extLst>
+              <a:ext uri="{FF2B5EF4-FFF2-40B4-BE49-F238E27FC236}">
+                <a16:creationId xmlns:a16="http://schemas.microsoft.com/office/drawing/2014/main" id="{378DD7F3-8B3D-4663-A742-D2031B2D8A09}"/>
+              </a:ext>
+            </a:extLst>
+          </p:cNvPr>
+          <p:cNvPicPr>
+            <a:picLocks noChangeAspect="1"/>
+          </p:cNvPicPr>
+          <p:nvPr/>
+        </p:nvPicPr>
+        <p:blipFill>
+          <a:blip r:embed="rId3">
+            <a:extLst>
+              <a:ext uri="{28A0092B-C50C-407E-A947-70E740481C1C}">
+                <a14:useLocalDpi xmlns:a14="http://schemas.microsoft.com/office/drawing/2010/main" val="0"/>
+              </a:ext>
+            </a:extLst>
+          </a:blip>
+          <a:stretch>
+            <a:fillRect/>
+          </a:stretch>
+        </p:blipFill>
+        <p:spPr>
+          <a:xfrm>
+            <a:off x="3733194" y="-12193"/>
+            <a:ext cx="573327" cy="573327"/>
+          </a:xfrm>
+          <a:prstGeom prst="rect">
+            <a:avLst/>
+          </a:prstGeom>
+        </p:spPr>
+      </p:pic>
+      <p:pic>
+        <p:nvPicPr>
+          <p:cNvPr id="30" name="图片 29">
+            <a:extLst>
+              <a:ext uri="{FF2B5EF4-FFF2-40B4-BE49-F238E27FC236}">
+                <a16:creationId xmlns:a16="http://schemas.microsoft.com/office/drawing/2014/main" id="{257A1CDB-5B88-4A04-A695-CB5FA8E0578F}"/>
+              </a:ext>
+            </a:extLst>
+          </p:cNvPr>
+          <p:cNvPicPr>
+            <a:picLocks noChangeAspect="1"/>
+          </p:cNvPicPr>
+          <p:nvPr/>
+        </p:nvPicPr>
+        <p:blipFill>
+          <a:blip r:embed="rId3">
+            <a:extLst>
+              <a:ext uri="{28A0092B-C50C-407E-A947-70E740481C1C}">
+                <a14:useLocalDpi xmlns:a14="http://schemas.microsoft.com/office/drawing/2010/main" val="0"/>
+              </a:ext>
+            </a:extLst>
+          </a:blip>
+          <a:stretch>
+            <a:fillRect/>
+          </a:stretch>
+        </p:blipFill>
+        <p:spPr>
+          <a:xfrm>
+            <a:off x="2586540" y="561135"/>
+            <a:ext cx="573327" cy="573327"/>
+          </a:xfrm>
+          <a:prstGeom prst="rect">
+            <a:avLst/>
+          </a:prstGeom>
+        </p:spPr>
+      </p:pic>
+      <p:pic>
+        <p:nvPicPr>
+          <p:cNvPr id="31" name="图片 30">
+            <a:extLst>
+              <a:ext uri="{FF2B5EF4-FFF2-40B4-BE49-F238E27FC236}">
+                <a16:creationId xmlns:a16="http://schemas.microsoft.com/office/drawing/2014/main" id="{4CBB28A1-0A9F-4850-A903-B1A2F8A4EF32}"/>
+              </a:ext>
+            </a:extLst>
+          </p:cNvPr>
+          <p:cNvPicPr>
+            <a:picLocks noChangeAspect="1"/>
+          </p:cNvPicPr>
+          <p:nvPr/>
+        </p:nvPicPr>
+        <p:blipFill>
+          <a:blip r:embed="rId3">
+            <a:extLst>
+              <a:ext uri="{28A0092B-C50C-407E-A947-70E740481C1C}">
+                <a14:useLocalDpi xmlns:a14="http://schemas.microsoft.com/office/drawing/2010/main" val="0"/>
+              </a:ext>
+            </a:extLst>
+          </a:blip>
+          <a:stretch>
+            <a:fillRect/>
+          </a:stretch>
+        </p:blipFill>
+        <p:spPr>
+          <a:xfrm>
+            <a:off x="3159867" y="561134"/>
+            <a:ext cx="573327" cy="573327"/>
+          </a:xfrm>
+          <a:prstGeom prst="rect">
+            <a:avLst/>
+          </a:prstGeom>
+        </p:spPr>
+      </p:pic>
+      <p:pic>
+        <p:nvPicPr>
+          <p:cNvPr id="32" name="图片 31">
+            <a:extLst>
+              <a:ext uri="{FF2B5EF4-FFF2-40B4-BE49-F238E27FC236}">
+                <a16:creationId xmlns:a16="http://schemas.microsoft.com/office/drawing/2014/main" id="{35001054-B46A-40DC-B8B9-F32CDAD2271D}"/>
+              </a:ext>
+            </a:extLst>
+          </p:cNvPr>
+          <p:cNvPicPr>
+            <a:picLocks noChangeAspect="1"/>
+          </p:cNvPicPr>
+          <p:nvPr/>
+        </p:nvPicPr>
+        <p:blipFill>
+          <a:blip r:embed="rId3">
+            <a:extLst>
+              <a:ext uri="{28A0092B-C50C-407E-A947-70E740481C1C}">
+                <a14:useLocalDpi xmlns:a14="http://schemas.microsoft.com/office/drawing/2010/main" val="0"/>
+              </a:ext>
+            </a:extLst>
+          </a:blip>
+          <a:stretch>
+            <a:fillRect/>
+          </a:stretch>
+        </p:blipFill>
+        <p:spPr>
+          <a:xfrm>
+            <a:off x="3733194" y="561134"/>
+            <a:ext cx="573327" cy="573327"/>
+          </a:xfrm>
+          <a:prstGeom prst="rect">
+            <a:avLst/>
+          </a:prstGeom>
+        </p:spPr>
+      </p:pic>
+      <p:pic>
+        <p:nvPicPr>
+          <p:cNvPr id="33" name="图片 32">
+            <a:extLst>
+              <a:ext uri="{FF2B5EF4-FFF2-40B4-BE49-F238E27FC236}">
+                <a16:creationId xmlns:a16="http://schemas.microsoft.com/office/drawing/2014/main" id="{4A061610-76E9-4D00-92A3-33BF3AC450C1}"/>
+              </a:ext>
+            </a:extLst>
+          </p:cNvPr>
+          <p:cNvPicPr>
+            <a:picLocks noChangeAspect="1"/>
+          </p:cNvPicPr>
+          <p:nvPr/>
+        </p:nvPicPr>
+        <p:blipFill>
+          <a:blip r:embed="rId3">
+            <a:extLst>
+              <a:ext uri="{28A0092B-C50C-407E-A947-70E740481C1C}">
+                <a14:useLocalDpi xmlns:a14="http://schemas.microsoft.com/office/drawing/2010/main" val="0"/>
+              </a:ext>
+            </a:extLst>
+          </a:blip>
+          <a:stretch>
+            <a:fillRect/>
+          </a:stretch>
+        </p:blipFill>
+        <p:spPr>
+          <a:xfrm>
+            <a:off x="6026502" y="-12193"/>
+            <a:ext cx="573327" cy="573327"/>
+          </a:xfrm>
+          <a:prstGeom prst="rect">
+            <a:avLst/>
+          </a:prstGeom>
+        </p:spPr>
+      </p:pic>
+      <p:pic>
+        <p:nvPicPr>
+          <p:cNvPr id="34" name="图片 33">
+            <a:extLst>
+              <a:ext uri="{FF2B5EF4-FFF2-40B4-BE49-F238E27FC236}">
+                <a16:creationId xmlns:a16="http://schemas.microsoft.com/office/drawing/2014/main" id="{C5E1118F-8054-4161-9FA6-20BCA423EAAE}"/>
+              </a:ext>
+            </a:extLst>
+          </p:cNvPr>
+          <p:cNvPicPr>
+            <a:picLocks noChangeAspect="1"/>
+          </p:cNvPicPr>
+          <p:nvPr/>
+        </p:nvPicPr>
+        <p:blipFill>
+          <a:blip r:embed="rId3">
+            <a:extLst>
+              <a:ext uri="{28A0092B-C50C-407E-A947-70E740481C1C}">
+                <a14:useLocalDpi xmlns:a14="http://schemas.microsoft.com/office/drawing/2010/main" val="0"/>
+              </a:ext>
+            </a:extLst>
+          </a:blip>
+          <a:stretch>
+            <a:fillRect/>
+          </a:stretch>
+        </p:blipFill>
+        <p:spPr>
+          <a:xfrm>
+            <a:off x="6599829" y="-12194"/>
+            <a:ext cx="573327" cy="573327"/>
+          </a:xfrm>
+          <a:prstGeom prst="rect">
+            <a:avLst/>
+          </a:prstGeom>
+        </p:spPr>
+      </p:pic>
+      <p:pic>
+        <p:nvPicPr>
+          <p:cNvPr id="35" name="图片 34">
+            <a:extLst>
+              <a:ext uri="{FF2B5EF4-FFF2-40B4-BE49-F238E27FC236}">
+                <a16:creationId xmlns:a16="http://schemas.microsoft.com/office/drawing/2014/main" id="{62B18E20-BB50-4CD7-B3DA-233E47E18BF2}"/>
+              </a:ext>
+            </a:extLst>
+          </p:cNvPr>
+          <p:cNvPicPr>
+            <a:picLocks noChangeAspect="1"/>
+          </p:cNvPicPr>
+          <p:nvPr/>
+        </p:nvPicPr>
+        <p:blipFill>
+          <a:blip r:embed="rId3">
+            <a:extLst>
+              <a:ext uri="{28A0092B-C50C-407E-A947-70E740481C1C}">
+                <a14:useLocalDpi xmlns:a14="http://schemas.microsoft.com/office/drawing/2010/main" val="0"/>
+              </a:ext>
+            </a:extLst>
+          </a:blip>
+          <a:stretch>
+            <a:fillRect/>
+          </a:stretch>
+        </p:blipFill>
+        <p:spPr>
+          <a:xfrm>
+            <a:off x="7173156" y="-12194"/>
+            <a:ext cx="573327" cy="573327"/>
+          </a:xfrm>
+          <a:prstGeom prst="rect">
+            <a:avLst/>
+          </a:prstGeom>
+        </p:spPr>
+      </p:pic>
+      <p:pic>
+        <p:nvPicPr>
+          <p:cNvPr id="36" name="图片 35">
+            <a:extLst>
+              <a:ext uri="{FF2B5EF4-FFF2-40B4-BE49-F238E27FC236}">
+                <a16:creationId xmlns:a16="http://schemas.microsoft.com/office/drawing/2014/main" id="{D7A2E40B-B7C6-45CD-B59A-70BAC8964038}"/>
+              </a:ext>
+            </a:extLst>
+          </p:cNvPr>
+          <p:cNvPicPr>
+            <a:picLocks noChangeAspect="1"/>
+          </p:cNvPicPr>
+          <p:nvPr/>
+        </p:nvPicPr>
+        <p:blipFill>
+          <a:blip r:embed="rId3">
+            <a:extLst>
+              <a:ext uri="{28A0092B-C50C-407E-A947-70E740481C1C}">
+                <a14:useLocalDpi xmlns:a14="http://schemas.microsoft.com/office/drawing/2010/main" val="0"/>
+              </a:ext>
+            </a:extLst>
+          </a:blip>
+          <a:stretch>
+            <a:fillRect/>
+          </a:stretch>
+        </p:blipFill>
+        <p:spPr>
+          <a:xfrm>
+            <a:off x="6026502" y="561134"/>
+            <a:ext cx="573327" cy="573327"/>
+          </a:xfrm>
+          <a:prstGeom prst="rect">
+            <a:avLst/>
+          </a:prstGeom>
+        </p:spPr>
+      </p:pic>
+      <p:pic>
+        <p:nvPicPr>
+          <p:cNvPr id="37" name="图片 36">
+            <a:extLst>
+              <a:ext uri="{FF2B5EF4-FFF2-40B4-BE49-F238E27FC236}">
+                <a16:creationId xmlns:a16="http://schemas.microsoft.com/office/drawing/2014/main" id="{CB849386-A22C-42B7-99DB-040C2EB4B8AE}"/>
+              </a:ext>
+            </a:extLst>
+          </p:cNvPr>
+          <p:cNvPicPr>
+            <a:picLocks noChangeAspect="1"/>
+          </p:cNvPicPr>
+          <p:nvPr/>
+        </p:nvPicPr>
+        <p:blipFill>
+          <a:blip r:embed="rId3">
+            <a:extLst>
+              <a:ext uri="{28A0092B-C50C-407E-A947-70E740481C1C}">
+                <a14:useLocalDpi xmlns:a14="http://schemas.microsoft.com/office/drawing/2010/main" val="0"/>
+              </a:ext>
+            </a:extLst>
+          </a:blip>
+          <a:stretch>
+            <a:fillRect/>
+          </a:stretch>
+        </p:blipFill>
+        <p:spPr>
+          <a:xfrm>
+            <a:off x="6599829" y="561133"/>
+            <a:ext cx="573327" cy="573327"/>
+          </a:xfrm>
+          <a:prstGeom prst="rect">
+            <a:avLst/>
+          </a:prstGeom>
+        </p:spPr>
+      </p:pic>
+      <p:pic>
+        <p:nvPicPr>
+          <p:cNvPr id="38" name="图片 37">
+            <a:extLst>
+              <a:ext uri="{FF2B5EF4-FFF2-40B4-BE49-F238E27FC236}">
+                <a16:creationId xmlns:a16="http://schemas.microsoft.com/office/drawing/2014/main" id="{6E0B6D90-0F5E-42DC-A013-F08C221E4B3C}"/>
+              </a:ext>
+            </a:extLst>
+          </p:cNvPr>
+          <p:cNvPicPr>
+            <a:picLocks noChangeAspect="1"/>
+          </p:cNvPicPr>
+          <p:nvPr/>
+        </p:nvPicPr>
+        <p:blipFill>
+          <a:blip r:embed="rId3">
+            <a:extLst>
+              <a:ext uri="{28A0092B-C50C-407E-A947-70E740481C1C}">
+                <a14:useLocalDpi xmlns:a14="http://schemas.microsoft.com/office/drawing/2010/main" val="0"/>
+              </a:ext>
+            </a:extLst>
+          </a:blip>
+          <a:stretch>
+            <a:fillRect/>
+          </a:stretch>
+        </p:blipFill>
+        <p:spPr>
+          <a:xfrm>
+            <a:off x="7173156" y="561133"/>
+            <a:ext cx="573327" cy="573327"/>
+          </a:xfrm>
+          <a:prstGeom prst="rect">
+            <a:avLst/>
+          </a:prstGeom>
+        </p:spPr>
+      </p:pic>
+      <p:pic>
+        <p:nvPicPr>
+          <p:cNvPr id="39" name="图片 38">
+            <a:extLst>
+              <a:ext uri="{FF2B5EF4-FFF2-40B4-BE49-F238E27FC236}">
+                <a16:creationId xmlns:a16="http://schemas.microsoft.com/office/drawing/2014/main" id="{80FB3152-846D-4717-8E76-43EE2B77A6B2}"/>
+              </a:ext>
+            </a:extLst>
+          </p:cNvPr>
+          <p:cNvPicPr>
+            <a:picLocks noChangeAspect="1"/>
+          </p:cNvPicPr>
+          <p:nvPr/>
+        </p:nvPicPr>
+        <p:blipFill>
+          <a:blip r:embed="rId3">
+            <a:extLst>
+              <a:ext uri="{28A0092B-C50C-407E-A947-70E740481C1C}">
+                <a14:useLocalDpi xmlns:a14="http://schemas.microsoft.com/office/drawing/2010/main" val="0"/>
+              </a:ext>
+            </a:extLst>
+          </a:blip>
+          <a:stretch>
+            <a:fillRect/>
+          </a:stretch>
+        </p:blipFill>
+        <p:spPr>
+          <a:xfrm>
+            <a:off x="866559" y="-12193"/>
+            <a:ext cx="573327" cy="573327"/>
+          </a:xfrm>
+          <a:prstGeom prst="rect">
+            <a:avLst/>
+          </a:prstGeom>
+        </p:spPr>
+      </p:pic>
+      <p:pic>
+        <p:nvPicPr>
+          <p:cNvPr id="40" name="图片 39">
+            <a:extLst>
+              <a:ext uri="{FF2B5EF4-FFF2-40B4-BE49-F238E27FC236}">
+                <a16:creationId xmlns:a16="http://schemas.microsoft.com/office/drawing/2014/main" id="{CEB69568-EFF8-4CF4-B324-4A7331D3C934}"/>
+              </a:ext>
+            </a:extLst>
+          </p:cNvPr>
+          <p:cNvPicPr>
+            <a:picLocks noChangeAspect="1"/>
+          </p:cNvPicPr>
+          <p:nvPr/>
+        </p:nvPicPr>
+        <p:blipFill>
+          <a:blip r:embed="rId3">
+            <a:extLst>
+              <a:ext uri="{28A0092B-C50C-407E-A947-70E740481C1C}">
+                <a14:useLocalDpi xmlns:a14="http://schemas.microsoft.com/office/drawing/2010/main" val="0"/>
+              </a:ext>
+            </a:extLst>
+          </a:blip>
+          <a:stretch>
+            <a:fillRect/>
+          </a:stretch>
+        </p:blipFill>
+        <p:spPr>
+          <a:xfrm>
+            <a:off x="1439886" y="-12194"/>
+            <a:ext cx="573327" cy="573327"/>
+          </a:xfrm>
+          <a:prstGeom prst="rect">
+            <a:avLst/>
+          </a:prstGeom>
+        </p:spPr>
+      </p:pic>
+      <p:pic>
+        <p:nvPicPr>
+          <p:cNvPr id="41" name="图片 40">
+            <a:extLst>
+              <a:ext uri="{FF2B5EF4-FFF2-40B4-BE49-F238E27FC236}">
+                <a16:creationId xmlns:a16="http://schemas.microsoft.com/office/drawing/2014/main" id="{B6E4BF1E-BA30-4D9C-A75B-0F5899195EC8}"/>
+              </a:ext>
+            </a:extLst>
+          </p:cNvPr>
+          <p:cNvPicPr>
+            <a:picLocks noChangeAspect="1"/>
+          </p:cNvPicPr>
+          <p:nvPr/>
+        </p:nvPicPr>
+        <p:blipFill>
+          <a:blip r:embed="rId3">
+            <a:extLst>
+              <a:ext uri="{28A0092B-C50C-407E-A947-70E740481C1C}">
+                <a14:useLocalDpi xmlns:a14="http://schemas.microsoft.com/office/drawing/2010/main" val="0"/>
+              </a:ext>
+            </a:extLst>
+          </a:blip>
+          <a:stretch>
+            <a:fillRect/>
+          </a:stretch>
+        </p:blipFill>
+        <p:spPr>
+          <a:xfrm>
+            <a:off x="2013213" y="-12194"/>
+            <a:ext cx="573327" cy="573327"/>
+          </a:xfrm>
+          <a:prstGeom prst="rect">
+            <a:avLst/>
+          </a:prstGeom>
+        </p:spPr>
+      </p:pic>
+      <p:pic>
+        <p:nvPicPr>
+          <p:cNvPr id="42" name="图片 41">
+            <a:extLst>
+              <a:ext uri="{FF2B5EF4-FFF2-40B4-BE49-F238E27FC236}">
+                <a16:creationId xmlns:a16="http://schemas.microsoft.com/office/drawing/2014/main" id="{E5A72214-4BFB-4416-991D-C28842C817B3}"/>
+              </a:ext>
+            </a:extLst>
+          </p:cNvPr>
+          <p:cNvPicPr>
+            <a:picLocks noChangeAspect="1"/>
+          </p:cNvPicPr>
+          <p:nvPr/>
+        </p:nvPicPr>
+        <p:blipFill>
+          <a:blip r:embed="rId3">
+            <a:extLst>
+              <a:ext uri="{28A0092B-C50C-407E-A947-70E740481C1C}">
+                <a14:useLocalDpi xmlns:a14="http://schemas.microsoft.com/office/drawing/2010/main" val="0"/>
+              </a:ext>
+            </a:extLst>
+          </a:blip>
+          <a:stretch>
+            <a:fillRect/>
+          </a:stretch>
+        </p:blipFill>
+        <p:spPr>
+          <a:xfrm>
+            <a:off x="866559" y="561134"/>
+            <a:ext cx="573327" cy="573327"/>
+          </a:xfrm>
+          <a:prstGeom prst="rect">
+            <a:avLst/>
+          </a:prstGeom>
+        </p:spPr>
+      </p:pic>
+      <p:pic>
+        <p:nvPicPr>
+          <p:cNvPr id="43" name="图片 42">
+            <a:extLst>
+              <a:ext uri="{FF2B5EF4-FFF2-40B4-BE49-F238E27FC236}">
+                <a16:creationId xmlns:a16="http://schemas.microsoft.com/office/drawing/2014/main" id="{FDA2D385-686B-4076-B412-220811D141C0}"/>
+              </a:ext>
+            </a:extLst>
+          </p:cNvPr>
+          <p:cNvPicPr>
+            <a:picLocks noChangeAspect="1"/>
+          </p:cNvPicPr>
+          <p:nvPr/>
+        </p:nvPicPr>
+        <p:blipFill>
+          <a:blip r:embed="rId3">
+            <a:extLst>
+              <a:ext uri="{28A0092B-C50C-407E-A947-70E740481C1C}">
+                <a14:useLocalDpi xmlns:a14="http://schemas.microsoft.com/office/drawing/2010/main" val="0"/>
+              </a:ext>
+            </a:extLst>
+          </a:blip>
+          <a:stretch>
+            <a:fillRect/>
+          </a:stretch>
+        </p:blipFill>
+        <p:spPr>
+          <a:xfrm>
+            <a:off x="1439886" y="561133"/>
+            <a:ext cx="573327" cy="573327"/>
+          </a:xfrm>
+          <a:prstGeom prst="rect">
+            <a:avLst/>
+          </a:prstGeom>
+        </p:spPr>
+      </p:pic>
+      <p:pic>
+        <p:nvPicPr>
+          <p:cNvPr id="44" name="图片 43">
+            <a:extLst>
+              <a:ext uri="{FF2B5EF4-FFF2-40B4-BE49-F238E27FC236}">
+                <a16:creationId xmlns:a16="http://schemas.microsoft.com/office/drawing/2014/main" id="{8A21933B-4844-4CC1-9DCA-BCC4CD444F11}"/>
+              </a:ext>
+            </a:extLst>
+          </p:cNvPr>
+          <p:cNvPicPr>
+            <a:picLocks noChangeAspect="1"/>
+          </p:cNvPicPr>
+          <p:nvPr/>
+        </p:nvPicPr>
+        <p:blipFill>
+          <a:blip r:embed="rId3">
+            <a:extLst>
+              <a:ext uri="{28A0092B-C50C-407E-A947-70E740481C1C}">
+                <a14:useLocalDpi xmlns:a14="http://schemas.microsoft.com/office/drawing/2010/main" val="0"/>
+              </a:ext>
+            </a:extLst>
+          </a:blip>
+          <a:stretch>
+            <a:fillRect/>
+          </a:stretch>
+        </p:blipFill>
+        <p:spPr>
+          <a:xfrm>
+            <a:off x="2013213" y="561133"/>
+            <a:ext cx="573327" cy="573327"/>
+          </a:xfrm>
+          <a:prstGeom prst="rect">
+            <a:avLst/>
+          </a:prstGeom>
+        </p:spPr>
+      </p:pic>
+      <p:pic>
+        <p:nvPicPr>
+          <p:cNvPr id="45" name="图片 44">
+            <a:extLst>
+              <a:ext uri="{FF2B5EF4-FFF2-40B4-BE49-F238E27FC236}">
+                <a16:creationId xmlns:a16="http://schemas.microsoft.com/office/drawing/2014/main" id="{5CC5E801-242C-416D-A67F-C9586CE43FAE}"/>
+              </a:ext>
+            </a:extLst>
+          </p:cNvPr>
+          <p:cNvPicPr>
+            <a:picLocks noChangeAspect="1"/>
+          </p:cNvPicPr>
+          <p:nvPr/>
+        </p:nvPicPr>
+        <p:blipFill>
+          <a:blip r:embed="rId3">
+            <a:extLst>
+              <a:ext uri="{28A0092B-C50C-407E-A947-70E740481C1C}">
+                <a14:useLocalDpi xmlns:a14="http://schemas.microsoft.com/office/drawing/2010/main" val="0"/>
+              </a:ext>
+            </a:extLst>
+          </a:blip>
+          <a:stretch>
+            <a:fillRect/>
+          </a:stretch>
+        </p:blipFill>
+        <p:spPr>
+          <a:xfrm>
+            <a:off x="-853422" y="-12194"/>
+            <a:ext cx="573327" cy="573327"/>
+          </a:xfrm>
+          <a:prstGeom prst="rect">
+            <a:avLst/>
+          </a:prstGeom>
+        </p:spPr>
+      </p:pic>
+      <p:pic>
+        <p:nvPicPr>
+          <p:cNvPr id="46" name="图片 45">
+            <a:extLst>
+              <a:ext uri="{FF2B5EF4-FFF2-40B4-BE49-F238E27FC236}">
+                <a16:creationId xmlns:a16="http://schemas.microsoft.com/office/drawing/2014/main" id="{46328F43-2946-458B-97A7-33B55FF00379}"/>
+              </a:ext>
+            </a:extLst>
+          </p:cNvPr>
+          <p:cNvPicPr>
+            <a:picLocks noChangeAspect="1"/>
+          </p:cNvPicPr>
+          <p:nvPr/>
+        </p:nvPicPr>
+        <p:blipFill>
+          <a:blip r:embed="rId3">
+            <a:extLst>
+              <a:ext uri="{28A0092B-C50C-407E-A947-70E740481C1C}">
+                <a14:useLocalDpi xmlns:a14="http://schemas.microsoft.com/office/drawing/2010/main" val="0"/>
+              </a:ext>
+            </a:extLst>
+          </a:blip>
+          <a:stretch>
+            <a:fillRect/>
+          </a:stretch>
+        </p:blipFill>
+        <p:spPr>
+          <a:xfrm>
+            <a:off x="-280095" y="-12195"/>
+            <a:ext cx="573327" cy="573327"/>
+          </a:xfrm>
+          <a:prstGeom prst="rect">
+            <a:avLst/>
+          </a:prstGeom>
+        </p:spPr>
+      </p:pic>
+      <p:pic>
+        <p:nvPicPr>
+          <p:cNvPr id="47" name="图片 46">
+            <a:extLst>
+              <a:ext uri="{FF2B5EF4-FFF2-40B4-BE49-F238E27FC236}">
+                <a16:creationId xmlns:a16="http://schemas.microsoft.com/office/drawing/2014/main" id="{B13E2FAB-37E0-4391-9CE2-BD999928ABFB}"/>
+              </a:ext>
+            </a:extLst>
+          </p:cNvPr>
+          <p:cNvPicPr>
+            <a:picLocks noChangeAspect="1"/>
+          </p:cNvPicPr>
+          <p:nvPr/>
+        </p:nvPicPr>
+        <p:blipFill>
+          <a:blip r:embed="rId3">
+            <a:extLst>
+              <a:ext uri="{28A0092B-C50C-407E-A947-70E740481C1C}">
+                <a14:useLocalDpi xmlns:a14="http://schemas.microsoft.com/office/drawing/2010/main" val="0"/>
+              </a:ext>
+            </a:extLst>
+          </a:blip>
+          <a:stretch>
+            <a:fillRect/>
+          </a:stretch>
+        </p:blipFill>
+        <p:spPr>
+          <a:xfrm>
+            <a:off x="293232" y="-12195"/>
+            <a:ext cx="573327" cy="573327"/>
+          </a:xfrm>
+          <a:prstGeom prst="rect">
+            <a:avLst/>
+          </a:prstGeom>
+        </p:spPr>
+      </p:pic>
+      <p:pic>
+        <p:nvPicPr>
+          <p:cNvPr id="48" name="图片 47">
+            <a:extLst>
+              <a:ext uri="{FF2B5EF4-FFF2-40B4-BE49-F238E27FC236}">
+                <a16:creationId xmlns:a16="http://schemas.microsoft.com/office/drawing/2014/main" id="{B236F0D6-5220-496E-B3B6-FD3D7C62F8CE}"/>
+              </a:ext>
+            </a:extLst>
+          </p:cNvPr>
+          <p:cNvPicPr>
+            <a:picLocks noChangeAspect="1"/>
+          </p:cNvPicPr>
+          <p:nvPr/>
+        </p:nvPicPr>
+        <p:blipFill>
+          <a:blip r:embed="rId3">
+            <a:extLst>
+              <a:ext uri="{28A0092B-C50C-407E-A947-70E740481C1C}">
+                <a14:useLocalDpi xmlns:a14="http://schemas.microsoft.com/office/drawing/2010/main" val="0"/>
+              </a:ext>
+            </a:extLst>
+          </a:blip>
+          <a:stretch>
+            <a:fillRect/>
+          </a:stretch>
+        </p:blipFill>
+        <p:spPr>
+          <a:xfrm>
+            <a:off x="-854027" y="1707785"/>
+            <a:ext cx="573327" cy="573327"/>
+          </a:xfrm>
+          <a:prstGeom prst="rect">
+            <a:avLst/>
+          </a:prstGeom>
+        </p:spPr>
+      </p:pic>
+      <p:pic>
+        <p:nvPicPr>
+          <p:cNvPr id="49" name="图片 48">
+            <a:extLst>
+              <a:ext uri="{FF2B5EF4-FFF2-40B4-BE49-F238E27FC236}">
+                <a16:creationId xmlns:a16="http://schemas.microsoft.com/office/drawing/2014/main" id="{02F583AC-71F4-475A-A672-70D6DEFB742D}"/>
+              </a:ext>
+            </a:extLst>
+          </p:cNvPr>
+          <p:cNvPicPr>
+            <a:picLocks noChangeAspect="1"/>
+          </p:cNvPicPr>
+          <p:nvPr/>
+        </p:nvPicPr>
+        <p:blipFill>
+          <a:blip r:embed="rId3">
+            <a:extLst>
+              <a:ext uri="{28A0092B-C50C-407E-A947-70E740481C1C}">
+                <a14:useLocalDpi xmlns:a14="http://schemas.microsoft.com/office/drawing/2010/main" val="0"/>
+              </a:ext>
+            </a:extLst>
+          </a:blip>
+          <a:stretch>
+            <a:fillRect/>
+          </a:stretch>
+        </p:blipFill>
+        <p:spPr>
+          <a:xfrm>
+            <a:off x="-853422" y="1134459"/>
+            <a:ext cx="573327" cy="573327"/>
+          </a:xfrm>
+          <a:prstGeom prst="rect">
+            <a:avLst/>
+          </a:prstGeom>
+        </p:spPr>
+      </p:pic>
+      <p:pic>
+        <p:nvPicPr>
+          <p:cNvPr id="50" name="图片 49">
+            <a:extLst>
+              <a:ext uri="{FF2B5EF4-FFF2-40B4-BE49-F238E27FC236}">
+                <a16:creationId xmlns:a16="http://schemas.microsoft.com/office/drawing/2014/main" id="{64237F2D-4F98-4F43-9549-837A31B8F619}"/>
+              </a:ext>
+            </a:extLst>
+          </p:cNvPr>
+          <p:cNvPicPr>
+            <a:picLocks noChangeAspect="1"/>
+          </p:cNvPicPr>
+          <p:nvPr/>
+        </p:nvPicPr>
+        <p:blipFill>
+          <a:blip r:embed="rId3">
+            <a:extLst>
+              <a:ext uri="{28A0092B-C50C-407E-A947-70E740481C1C}">
+                <a14:useLocalDpi xmlns:a14="http://schemas.microsoft.com/office/drawing/2010/main" val="0"/>
+              </a:ext>
+            </a:extLst>
+          </a:blip>
+          <a:stretch>
+            <a:fillRect/>
+          </a:stretch>
+        </p:blipFill>
+        <p:spPr>
+          <a:xfrm>
+            <a:off x="-852817" y="561132"/>
+            <a:ext cx="573327" cy="573327"/>
+          </a:xfrm>
+          <a:prstGeom prst="rect">
+            <a:avLst/>
+          </a:prstGeom>
+        </p:spPr>
+      </p:pic>
+      <p:pic>
+        <p:nvPicPr>
+          <p:cNvPr id="51" name="图片 50">
+            <a:extLst>
+              <a:ext uri="{FF2B5EF4-FFF2-40B4-BE49-F238E27FC236}">
+                <a16:creationId xmlns:a16="http://schemas.microsoft.com/office/drawing/2014/main" id="{B8AC1375-4204-4BDA-921E-265B61207BF6}"/>
+              </a:ext>
+            </a:extLst>
+          </p:cNvPr>
+          <p:cNvPicPr>
+            <a:picLocks noChangeAspect="1"/>
+          </p:cNvPicPr>
+          <p:nvPr/>
+        </p:nvPicPr>
+        <p:blipFill>
+          <a:blip r:embed="rId3">
+            <a:extLst>
+              <a:ext uri="{28A0092B-C50C-407E-A947-70E740481C1C}">
+                <a14:useLocalDpi xmlns:a14="http://schemas.microsoft.com/office/drawing/2010/main" val="0"/>
+              </a:ext>
+            </a:extLst>
+          </a:blip>
+          <a:stretch>
+            <a:fillRect/>
+          </a:stretch>
+        </p:blipFill>
+        <p:spPr>
+          <a:xfrm>
+            <a:off x="-854632" y="2281111"/>
+            <a:ext cx="573327" cy="573327"/>
+          </a:xfrm>
+          <a:prstGeom prst="rect">
+            <a:avLst/>
+          </a:prstGeom>
+        </p:spPr>
+      </p:pic>
+      <p:pic>
+        <p:nvPicPr>
+          <p:cNvPr id="52" name="图片 51">
+            <a:extLst>
+              <a:ext uri="{FF2B5EF4-FFF2-40B4-BE49-F238E27FC236}">
+                <a16:creationId xmlns:a16="http://schemas.microsoft.com/office/drawing/2014/main" id="{6CD2BBBA-8304-47AA-B2CA-63BA322B9AC9}"/>
+              </a:ext>
+            </a:extLst>
+          </p:cNvPr>
+          <p:cNvPicPr>
+            <a:picLocks noChangeAspect="1"/>
+          </p:cNvPicPr>
+          <p:nvPr/>
+        </p:nvPicPr>
+        <p:blipFill>
+          <a:blip r:embed="rId3">
+            <a:extLst>
+              <a:ext uri="{28A0092B-C50C-407E-A947-70E740481C1C}">
+                <a14:useLocalDpi xmlns:a14="http://schemas.microsoft.com/office/drawing/2010/main" val="0"/>
+              </a:ext>
+            </a:extLst>
+          </a:blip>
+          <a:stretch>
+            <a:fillRect/>
+          </a:stretch>
+        </p:blipFill>
+        <p:spPr>
+          <a:xfrm>
+            <a:off x="-855237" y="4001090"/>
+            <a:ext cx="573327" cy="573327"/>
+          </a:xfrm>
+          <a:prstGeom prst="rect">
+            <a:avLst/>
+          </a:prstGeom>
+        </p:spPr>
+      </p:pic>
+      <p:pic>
+        <p:nvPicPr>
+          <p:cNvPr id="53" name="图片 52">
+            <a:extLst>
+              <a:ext uri="{FF2B5EF4-FFF2-40B4-BE49-F238E27FC236}">
+                <a16:creationId xmlns:a16="http://schemas.microsoft.com/office/drawing/2014/main" id="{384D9E37-B1E3-47FF-AAB9-2C0FDAE12B60}"/>
+              </a:ext>
+            </a:extLst>
+          </p:cNvPr>
+          <p:cNvPicPr>
+            <a:picLocks noChangeAspect="1"/>
+          </p:cNvPicPr>
+          <p:nvPr/>
+        </p:nvPicPr>
+        <p:blipFill>
+          <a:blip r:embed="rId3">
+            <a:extLst>
+              <a:ext uri="{28A0092B-C50C-407E-A947-70E740481C1C}">
+                <a14:useLocalDpi xmlns:a14="http://schemas.microsoft.com/office/drawing/2010/main" val="0"/>
+              </a:ext>
+            </a:extLst>
+          </a:blip>
+          <a:stretch>
+            <a:fillRect/>
+          </a:stretch>
+        </p:blipFill>
+        <p:spPr>
+          <a:xfrm>
+            <a:off x="-854632" y="3427764"/>
+            <a:ext cx="573327" cy="573327"/>
+          </a:xfrm>
+          <a:prstGeom prst="rect">
+            <a:avLst/>
+          </a:prstGeom>
+        </p:spPr>
+      </p:pic>
+      <p:pic>
+        <p:nvPicPr>
+          <p:cNvPr id="54" name="图片 53">
+            <a:extLst>
+              <a:ext uri="{FF2B5EF4-FFF2-40B4-BE49-F238E27FC236}">
+                <a16:creationId xmlns:a16="http://schemas.microsoft.com/office/drawing/2014/main" id="{26124198-6F7D-4510-AFA2-A3CCDB2867A6}"/>
+              </a:ext>
+            </a:extLst>
+          </p:cNvPr>
+          <p:cNvPicPr>
+            <a:picLocks noChangeAspect="1"/>
+          </p:cNvPicPr>
+          <p:nvPr/>
+        </p:nvPicPr>
+        <p:blipFill>
+          <a:blip r:embed="rId3">
+            <a:extLst>
+              <a:ext uri="{28A0092B-C50C-407E-A947-70E740481C1C}">
+                <a14:useLocalDpi xmlns:a14="http://schemas.microsoft.com/office/drawing/2010/main" val="0"/>
+              </a:ext>
+            </a:extLst>
+          </a:blip>
+          <a:stretch>
+            <a:fillRect/>
+          </a:stretch>
+        </p:blipFill>
+        <p:spPr>
+          <a:xfrm>
+            <a:off x="-854027" y="2854437"/>
+            <a:ext cx="573327" cy="573327"/>
+          </a:xfrm>
+          <a:prstGeom prst="rect">
+            <a:avLst/>
+          </a:prstGeom>
+        </p:spPr>
+      </p:pic>
+      <p:pic>
+        <p:nvPicPr>
+          <p:cNvPr id="55" name="图片 54">
+            <a:extLst>
+              <a:ext uri="{FF2B5EF4-FFF2-40B4-BE49-F238E27FC236}">
+                <a16:creationId xmlns:a16="http://schemas.microsoft.com/office/drawing/2014/main" id="{0E9256E6-6261-47A2-A792-B37E2C62737E}"/>
+              </a:ext>
+            </a:extLst>
+          </p:cNvPr>
+          <p:cNvPicPr>
+            <a:picLocks noChangeAspect="1"/>
+          </p:cNvPicPr>
+          <p:nvPr/>
+        </p:nvPicPr>
+        <p:blipFill>
+          <a:blip r:embed="rId3">
+            <a:extLst>
+              <a:ext uri="{28A0092B-C50C-407E-A947-70E740481C1C}">
+                <a14:useLocalDpi xmlns:a14="http://schemas.microsoft.com/office/drawing/2010/main" val="0"/>
+              </a:ext>
+            </a:extLst>
+          </a:blip>
+          <a:stretch>
+            <a:fillRect/>
+          </a:stretch>
+        </p:blipFill>
+        <p:spPr>
+          <a:xfrm>
+            <a:off x="-855237" y="4574416"/>
+            <a:ext cx="573327" cy="573327"/>
+          </a:xfrm>
+          <a:prstGeom prst="rect">
+            <a:avLst/>
+          </a:prstGeom>
+        </p:spPr>
+      </p:pic>
+      <p:pic>
+        <p:nvPicPr>
+          <p:cNvPr id="57" name="图片 56">
+            <a:extLst>
+              <a:ext uri="{FF2B5EF4-FFF2-40B4-BE49-F238E27FC236}">
+                <a16:creationId xmlns:a16="http://schemas.microsoft.com/office/drawing/2014/main" id="{B343ADAA-D5D8-4C05-B9EC-91B09992B5EE}"/>
+              </a:ext>
+            </a:extLst>
+          </p:cNvPr>
+          <p:cNvPicPr>
+            <a:picLocks noChangeAspect="1"/>
+          </p:cNvPicPr>
+          <p:nvPr/>
+        </p:nvPicPr>
+        <p:blipFill>
+          <a:blip r:embed="rId3">
+            <a:extLst>
+              <a:ext uri="{28A0092B-C50C-407E-A947-70E740481C1C}">
+                <a14:useLocalDpi xmlns:a14="http://schemas.microsoft.com/office/drawing/2010/main" val="0"/>
+              </a:ext>
+            </a:extLst>
+          </a:blip>
+          <a:stretch>
+            <a:fillRect/>
+          </a:stretch>
+        </p:blipFill>
+        <p:spPr>
+          <a:xfrm>
+            <a:off x="-855237" y="5721069"/>
+            <a:ext cx="573327" cy="573327"/>
+          </a:xfrm>
+          <a:prstGeom prst="rect">
+            <a:avLst/>
+          </a:prstGeom>
+        </p:spPr>
+      </p:pic>
+      <p:pic>
+        <p:nvPicPr>
+          <p:cNvPr id="58" name="图片 57">
+            <a:extLst>
+              <a:ext uri="{FF2B5EF4-FFF2-40B4-BE49-F238E27FC236}">
+                <a16:creationId xmlns:a16="http://schemas.microsoft.com/office/drawing/2014/main" id="{0FC23037-0CEA-493B-ADE6-A534919EFC6A}"/>
+              </a:ext>
+            </a:extLst>
+          </p:cNvPr>
+          <p:cNvPicPr>
+            <a:picLocks noChangeAspect="1"/>
+          </p:cNvPicPr>
+          <p:nvPr/>
+        </p:nvPicPr>
+        <p:blipFill>
+          <a:blip r:embed="rId3">
+            <a:extLst>
+              <a:ext uri="{28A0092B-C50C-407E-A947-70E740481C1C}">
+                <a14:useLocalDpi xmlns:a14="http://schemas.microsoft.com/office/drawing/2010/main" val="0"/>
+              </a:ext>
+            </a:extLst>
+          </a:blip>
+          <a:stretch>
+            <a:fillRect/>
+          </a:stretch>
+        </p:blipFill>
+        <p:spPr>
+          <a:xfrm>
+            <a:off x="-854632" y="5147742"/>
+            <a:ext cx="573327" cy="573327"/>
+          </a:xfrm>
+          <a:prstGeom prst="rect">
+            <a:avLst/>
+          </a:prstGeom>
+        </p:spPr>
+      </p:pic>
+      <p:pic>
+        <p:nvPicPr>
+          <p:cNvPr id="64" name="图片 63">
+            <a:extLst>
+              <a:ext uri="{FF2B5EF4-FFF2-40B4-BE49-F238E27FC236}">
+                <a16:creationId xmlns:a16="http://schemas.microsoft.com/office/drawing/2014/main" id="{FB2F261C-0F46-4E57-A6B0-FA8E9A8CDF60}"/>
+              </a:ext>
+            </a:extLst>
+          </p:cNvPr>
+          <p:cNvPicPr>
+            <a:picLocks noChangeAspect="1"/>
+          </p:cNvPicPr>
+          <p:nvPr/>
+        </p:nvPicPr>
+        <p:blipFill>
+          <a:blip r:embed="rId5">
+            <a:extLst>
+              <a:ext uri="{28A0092B-C50C-407E-A947-70E740481C1C}">
+                <a14:useLocalDpi xmlns:a14="http://schemas.microsoft.com/office/drawing/2010/main" val="0"/>
+              </a:ext>
+            </a:extLst>
+          </a:blip>
+          <a:stretch>
+            <a:fillRect/>
+          </a:stretch>
+        </p:blipFill>
+        <p:spPr>
+          <a:xfrm>
+            <a:off x="-805047" y="305030"/>
+            <a:ext cx="1340166" cy="1272310"/>
+          </a:xfrm>
+          <a:prstGeom prst="rect">
+            <a:avLst/>
+          </a:prstGeom>
+        </p:spPr>
+      </p:pic>
+      <p:pic>
+        <p:nvPicPr>
+          <p:cNvPr id="65" name="图片 64">
+            <a:extLst>
+              <a:ext uri="{FF2B5EF4-FFF2-40B4-BE49-F238E27FC236}">
+                <a16:creationId xmlns:a16="http://schemas.microsoft.com/office/drawing/2014/main" id="{A6840DC6-25A4-4C6A-B106-14184F0E6E5E}"/>
+              </a:ext>
+            </a:extLst>
+          </p:cNvPr>
+          <p:cNvPicPr>
+            <a:picLocks noChangeAspect="1"/>
+          </p:cNvPicPr>
+          <p:nvPr/>
+        </p:nvPicPr>
+        <p:blipFill>
+          <a:blip r:embed="rId3">
+            <a:extLst>
+              <a:ext uri="{28A0092B-C50C-407E-A947-70E740481C1C}">
+                <a14:useLocalDpi xmlns:a14="http://schemas.microsoft.com/office/drawing/2010/main" val="0"/>
+              </a:ext>
+            </a:extLst>
+          </a:blip>
+          <a:stretch>
+            <a:fillRect/>
+          </a:stretch>
+        </p:blipFill>
+        <p:spPr>
+          <a:xfrm>
+            <a:off x="-1428564" y="0"/>
+            <a:ext cx="573327" cy="6771640"/>
+          </a:xfrm>
+          <a:prstGeom prst="rect">
+            <a:avLst/>
+          </a:prstGeom>
+        </p:spPr>
+      </p:pic>
+      <p:pic>
+        <p:nvPicPr>
+          <p:cNvPr id="66" name="图片 65">
+            <a:extLst>
+              <a:ext uri="{FF2B5EF4-FFF2-40B4-BE49-F238E27FC236}">
+                <a16:creationId xmlns:a16="http://schemas.microsoft.com/office/drawing/2014/main" id="{10CF465D-3E25-47C9-9A34-DEA51C358FDB}"/>
+              </a:ext>
+            </a:extLst>
+          </p:cNvPr>
+          <p:cNvPicPr>
+            <a:picLocks noChangeAspect="1"/>
+          </p:cNvPicPr>
+          <p:nvPr/>
+        </p:nvPicPr>
+        <p:blipFill>
+          <a:blip r:embed="rId3">
+            <a:extLst>
+              <a:ext uri="{28A0092B-C50C-407E-A947-70E740481C1C}">
+                <a14:useLocalDpi xmlns:a14="http://schemas.microsoft.com/office/drawing/2010/main" val="0"/>
+              </a:ext>
+            </a:extLst>
+          </a:blip>
+          <a:stretch>
+            <a:fillRect/>
+          </a:stretch>
+        </p:blipFill>
+        <p:spPr>
+          <a:xfrm>
+            <a:off x="7746483" y="0"/>
+            <a:ext cx="573327" cy="6771640"/>
+          </a:xfrm>
+          <a:prstGeom prst="rect">
+            <a:avLst/>
+          </a:prstGeom>
+        </p:spPr>
+      </p:pic>
+      <p:pic>
+        <p:nvPicPr>
+          <p:cNvPr id="67" name="图片 66">
+            <a:extLst>
+              <a:ext uri="{FF2B5EF4-FFF2-40B4-BE49-F238E27FC236}">
+                <a16:creationId xmlns:a16="http://schemas.microsoft.com/office/drawing/2014/main" id="{C9F200DB-A853-4074-92EF-96B17516E0BE}"/>
+              </a:ext>
+            </a:extLst>
+          </p:cNvPr>
+          <p:cNvPicPr>
+            <a:picLocks noChangeAspect="1"/>
+          </p:cNvPicPr>
+          <p:nvPr/>
+        </p:nvPicPr>
+        <p:blipFill>
+          <a:blip r:embed="rId3">
+            <a:extLst>
+              <a:ext uri="{28A0092B-C50C-407E-A947-70E740481C1C}">
+                <a14:useLocalDpi xmlns:a14="http://schemas.microsoft.com/office/drawing/2010/main" val="0"/>
+              </a:ext>
+            </a:extLst>
+          </a:blip>
+          <a:stretch>
+            <a:fillRect/>
+          </a:stretch>
+        </p:blipFill>
+        <p:spPr>
+          <a:xfrm>
+            <a:off x="-843639" y="6294394"/>
+            <a:ext cx="8707479" cy="573327"/>
+          </a:xfrm>
+          <a:prstGeom prst="rect">
+            <a:avLst/>
+          </a:prstGeom>
+        </p:spPr>
+      </p:pic>
+      <p:pic>
+        <p:nvPicPr>
+          <p:cNvPr id="68" name="图片 67">
+            <a:extLst>
+              <a:ext uri="{FF2B5EF4-FFF2-40B4-BE49-F238E27FC236}">
+                <a16:creationId xmlns:a16="http://schemas.microsoft.com/office/drawing/2014/main" id="{30F21C41-CAE8-440A-8421-E429801FC5AF}"/>
+              </a:ext>
+            </a:extLst>
+          </p:cNvPr>
+          <p:cNvPicPr>
+            <a:picLocks noChangeAspect="1"/>
+          </p:cNvPicPr>
+          <p:nvPr/>
+        </p:nvPicPr>
+        <p:blipFill>
+          <a:blip r:embed="rId3">
+            <a:extLst>
+              <a:ext uri="{28A0092B-C50C-407E-A947-70E740481C1C}">
+                <a14:useLocalDpi xmlns:a14="http://schemas.microsoft.com/office/drawing/2010/main" val="0"/>
+              </a:ext>
+            </a:extLst>
+          </a:blip>
+          <a:stretch>
+            <a:fillRect/>
+          </a:stretch>
+        </p:blipFill>
+        <p:spPr>
+          <a:xfrm>
+            <a:off x="2018105" y="1134458"/>
+            <a:ext cx="573327" cy="573327"/>
+          </a:xfrm>
+          <a:prstGeom prst="rect">
+            <a:avLst/>
+          </a:prstGeom>
+        </p:spPr>
+      </p:pic>
+      <p:pic>
+        <p:nvPicPr>
+          <p:cNvPr id="69" name="图片 68">
+            <a:extLst>
+              <a:ext uri="{FF2B5EF4-FFF2-40B4-BE49-F238E27FC236}">
+                <a16:creationId xmlns:a16="http://schemas.microsoft.com/office/drawing/2014/main" id="{EC036B2A-68D7-4AC3-964F-DFF66C3942E7}"/>
+              </a:ext>
+            </a:extLst>
+          </p:cNvPr>
+          <p:cNvPicPr>
+            <a:picLocks noChangeAspect="1"/>
+          </p:cNvPicPr>
+          <p:nvPr/>
+        </p:nvPicPr>
+        <p:blipFill>
+          <a:blip r:embed="rId3">
+            <a:extLst>
+              <a:ext uri="{28A0092B-C50C-407E-A947-70E740481C1C}">
+                <a14:useLocalDpi xmlns:a14="http://schemas.microsoft.com/office/drawing/2010/main" val="0"/>
+              </a:ext>
+            </a:extLst>
+          </a:blip>
+          <a:stretch>
+            <a:fillRect/>
+          </a:stretch>
+        </p:blipFill>
+        <p:spPr>
+          <a:xfrm>
+            <a:off x="2591432" y="1134457"/>
+            <a:ext cx="573327" cy="573327"/>
+          </a:xfrm>
+          <a:prstGeom prst="rect">
+            <a:avLst/>
+          </a:prstGeom>
+        </p:spPr>
+      </p:pic>
+      <p:pic>
+        <p:nvPicPr>
+          <p:cNvPr id="70" name="图片 69">
+            <a:extLst>
+              <a:ext uri="{FF2B5EF4-FFF2-40B4-BE49-F238E27FC236}">
+                <a16:creationId xmlns:a16="http://schemas.microsoft.com/office/drawing/2014/main" id="{E2FD4270-0AB4-4D69-A496-73A91A762E85}"/>
+              </a:ext>
+            </a:extLst>
+          </p:cNvPr>
+          <p:cNvPicPr>
+            <a:picLocks noChangeAspect="1"/>
+          </p:cNvPicPr>
+          <p:nvPr/>
+        </p:nvPicPr>
+        <p:blipFill>
+          <a:blip r:embed="rId3">
+            <a:extLst>
+              <a:ext uri="{28A0092B-C50C-407E-A947-70E740481C1C}">
+                <a14:useLocalDpi xmlns:a14="http://schemas.microsoft.com/office/drawing/2010/main" val="0"/>
+              </a:ext>
+            </a:extLst>
+          </a:blip>
+          <a:stretch>
+            <a:fillRect/>
+          </a:stretch>
+        </p:blipFill>
+        <p:spPr>
+          <a:xfrm>
+            <a:off x="3164759" y="1134457"/>
+            <a:ext cx="573327" cy="573327"/>
+          </a:xfrm>
+          <a:prstGeom prst="rect">
+            <a:avLst/>
+          </a:prstGeom>
+        </p:spPr>
+      </p:pic>
+      <p:pic>
+        <p:nvPicPr>
+          <p:cNvPr id="71" name="图片 70">
+            <a:extLst>
+              <a:ext uri="{FF2B5EF4-FFF2-40B4-BE49-F238E27FC236}">
+                <a16:creationId xmlns:a16="http://schemas.microsoft.com/office/drawing/2014/main" id="{593FDE5F-52BC-4A14-BED9-BE38D15D2869}"/>
+              </a:ext>
+            </a:extLst>
+          </p:cNvPr>
+          <p:cNvPicPr>
+            <a:picLocks noChangeAspect="1"/>
+          </p:cNvPicPr>
+          <p:nvPr/>
+        </p:nvPicPr>
+        <p:blipFill>
+          <a:blip r:embed="rId3">
+            <a:extLst>
+              <a:ext uri="{28A0092B-C50C-407E-A947-70E740481C1C}">
+                <a14:useLocalDpi xmlns:a14="http://schemas.microsoft.com/office/drawing/2010/main" val="0"/>
+              </a:ext>
+            </a:extLst>
+          </a:blip>
+          <a:stretch>
+            <a:fillRect/>
+          </a:stretch>
+        </p:blipFill>
+        <p:spPr>
+          <a:xfrm>
+            <a:off x="2018105" y="1707785"/>
+            <a:ext cx="573327" cy="573327"/>
+          </a:xfrm>
+          <a:prstGeom prst="rect">
+            <a:avLst/>
+          </a:prstGeom>
+        </p:spPr>
+      </p:pic>
+      <p:pic>
+        <p:nvPicPr>
+          <p:cNvPr id="72" name="图片 71">
+            <a:extLst>
+              <a:ext uri="{FF2B5EF4-FFF2-40B4-BE49-F238E27FC236}">
+                <a16:creationId xmlns:a16="http://schemas.microsoft.com/office/drawing/2014/main" id="{6015FFB5-3FAF-4750-BFED-0F808BFA2103}"/>
+              </a:ext>
+            </a:extLst>
+          </p:cNvPr>
+          <p:cNvPicPr>
+            <a:picLocks noChangeAspect="1"/>
+          </p:cNvPicPr>
+          <p:nvPr/>
+        </p:nvPicPr>
+        <p:blipFill>
+          <a:blip r:embed="rId3">
+            <a:extLst>
+              <a:ext uri="{28A0092B-C50C-407E-A947-70E740481C1C}">
+                <a14:useLocalDpi xmlns:a14="http://schemas.microsoft.com/office/drawing/2010/main" val="0"/>
+              </a:ext>
+            </a:extLst>
+          </a:blip>
+          <a:stretch>
+            <a:fillRect/>
+          </a:stretch>
+        </p:blipFill>
+        <p:spPr>
+          <a:xfrm>
+            <a:off x="2591432" y="1707784"/>
+            <a:ext cx="573327" cy="573327"/>
+          </a:xfrm>
+          <a:prstGeom prst="rect">
+            <a:avLst/>
+          </a:prstGeom>
+        </p:spPr>
+      </p:pic>
+      <p:pic>
+        <p:nvPicPr>
+          <p:cNvPr id="73" name="图片 72">
+            <a:extLst>
+              <a:ext uri="{FF2B5EF4-FFF2-40B4-BE49-F238E27FC236}">
+                <a16:creationId xmlns:a16="http://schemas.microsoft.com/office/drawing/2014/main" id="{B46BA3EF-C017-455A-B4C9-0CB445B36FD1}"/>
+              </a:ext>
+            </a:extLst>
+          </p:cNvPr>
+          <p:cNvPicPr>
+            <a:picLocks noChangeAspect="1"/>
+          </p:cNvPicPr>
+          <p:nvPr/>
+        </p:nvPicPr>
+        <p:blipFill>
+          <a:blip r:embed="rId3">
+            <a:extLst>
+              <a:ext uri="{28A0092B-C50C-407E-A947-70E740481C1C}">
+                <a14:useLocalDpi xmlns:a14="http://schemas.microsoft.com/office/drawing/2010/main" val="0"/>
+              </a:ext>
+            </a:extLst>
+          </a:blip>
+          <a:stretch>
+            <a:fillRect/>
+          </a:stretch>
+        </p:blipFill>
+        <p:spPr>
+          <a:xfrm>
+            <a:off x="3164759" y="1707784"/>
+            <a:ext cx="573327" cy="573327"/>
+          </a:xfrm>
+          <a:prstGeom prst="rect">
+            <a:avLst/>
+          </a:prstGeom>
+        </p:spPr>
+      </p:pic>
+      <p:pic>
+        <p:nvPicPr>
+          <p:cNvPr id="74" name="图片 73">
+            <a:extLst>
+              <a:ext uri="{FF2B5EF4-FFF2-40B4-BE49-F238E27FC236}">
+                <a16:creationId xmlns:a16="http://schemas.microsoft.com/office/drawing/2014/main" id="{EF8EC185-2148-4F2E-A8AF-1D149A856369}"/>
+              </a:ext>
+            </a:extLst>
+          </p:cNvPr>
+          <p:cNvPicPr>
+            <a:picLocks noChangeAspect="1"/>
+          </p:cNvPicPr>
+          <p:nvPr/>
+        </p:nvPicPr>
+        <p:blipFill>
+          <a:blip r:embed="rId3">
+            <a:extLst>
+              <a:ext uri="{28A0092B-C50C-407E-A947-70E740481C1C}">
+                <a14:useLocalDpi xmlns:a14="http://schemas.microsoft.com/office/drawing/2010/main" val="0"/>
+              </a:ext>
+            </a:extLst>
+          </a:blip>
+          <a:stretch>
+            <a:fillRect/>
+          </a:stretch>
+        </p:blipFill>
+        <p:spPr>
+          <a:xfrm>
+            <a:off x="2013213" y="2281108"/>
+            <a:ext cx="573327" cy="573327"/>
+          </a:xfrm>
+          <a:prstGeom prst="rect">
+            <a:avLst/>
+          </a:prstGeom>
+        </p:spPr>
+      </p:pic>
+      <p:pic>
+        <p:nvPicPr>
+          <p:cNvPr id="75" name="图片 74">
+            <a:extLst>
+              <a:ext uri="{FF2B5EF4-FFF2-40B4-BE49-F238E27FC236}">
+                <a16:creationId xmlns:a16="http://schemas.microsoft.com/office/drawing/2014/main" id="{F5102676-B4FE-4F32-A637-0D22F6CC7078}"/>
+              </a:ext>
+            </a:extLst>
+          </p:cNvPr>
+          <p:cNvPicPr>
+            <a:picLocks noChangeAspect="1"/>
+          </p:cNvPicPr>
+          <p:nvPr/>
+        </p:nvPicPr>
+        <p:blipFill>
+          <a:blip r:embed="rId3">
+            <a:extLst>
+              <a:ext uri="{28A0092B-C50C-407E-A947-70E740481C1C}">
+                <a14:useLocalDpi xmlns:a14="http://schemas.microsoft.com/office/drawing/2010/main" val="0"/>
+              </a:ext>
+            </a:extLst>
+          </a:blip>
+          <a:stretch>
+            <a:fillRect/>
+          </a:stretch>
+        </p:blipFill>
+        <p:spPr>
+          <a:xfrm>
+            <a:off x="2586540" y="2281107"/>
+            <a:ext cx="573327" cy="573327"/>
+          </a:xfrm>
+          <a:prstGeom prst="rect">
+            <a:avLst/>
+          </a:prstGeom>
+        </p:spPr>
+      </p:pic>
+      <p:pic>
+        <p:nvPicPr>
+          <p:cNvPr id="76" name="图片 75">
+            <a:extLst>
+              <a:ext uri="{FF2B5EF4-FFF2-40B4-BE49-F238E27FC236}">
+                <a16:creationId xmlns:a16="http://schemas.microsoft.com/office/drawing/2014/main" id="{D079E6F7-0955-4434-B4A9-6FA0083DF5C4}"/>
+              </a:ext>
+            </a:extLst>
+          </p:cNvPr>
+          <p:cNvPicPr>
+            <a:picLocks noChangeAspect="1"/>
+          </p:cNvPicPr>
+          <p:nvPr/>
+        </p:nvPicPr>
+        <p:blipFill>
+          <a:blip r:embed="rId3">
+            <a:extLst>
+              <a:ext uri="{28A0092B-C50C-407E-A947-70E740481C1C}">
+                <a14:useLocalDpi xmlns:a14="http://schemas.microsoft.com/office/drawing/2010/main" val="0"/>
+              </a:ext>
+            </a:extLst>
+          </a:blip>
+          <a:stretch>
+            <a:fillRect/>
+          </a:stretch>
+        </p:blipFill>
+        <p:spPr>
+          <a:xfrm>
+            <a:off x="3159867" y="2281107"/>
+            <a:ext cx="573327" cy="573327"/>
+          </a:xfrm>
+          <a:prstGeom prst="rect">
+            <a:avLst/>
+          </a:prstGeom>
+        </p:spPr>
+      </p:pic>
+      <p:pic>
+        <p:nvPicPr>
+          <p:cNvPr id="77" name="图片 76">
+            <a:extLst>
+              <a:ext uri="{FF2B5EF4-FFF2-40B4-BE49-F238E27FC236}">
+                <a16:creationId xmlns:a16="http://schemas.microsoft.com/office/drawing/2014/main" id="{40CDF3A8-DE1C-48F3-8D34-2F9F804B7D30}"/>
+              </a:ext>
+            </a:extLst>
+          </p:cNvPr>
+          <p:cNvPicPr>
+            <a:picLocks noChangeAspect="1"/>
+          </p:cNvPicPr>
+          <p:nvPr/>
+        </p:nvPicPr>
+        <p:blipFill>
+          <a:blip r:embed="rId3">
+            <a:extLst>
+              <a:ext uri="{28A0092B-C50C-407E-A947-70E740481C1C}">
+                <a14:useLocalDpi xmlns:a14="http://schemas.microsoft.com/office/drawing/2010/main" val="0"/>
+              </a:ext>
+            </a:extLst>
+          </a:blip>
+          <a:stretch>
+            <a:fillRect/>
+          </a:stretch>
+        </p:blipFill>
+        <p:spPr>
+          <a:xfrm>
+            <a:off x="2013213" y="2854435"/>
+            <a:ext cx="573327" cy="573327"/>
+          </a:xfrm>
+          <a:prstGeom prst="rect">
+            <a:avLst/>
+          </a:prstGeom>
+        </p:spPr>
+      </p:pic>
+      <p:pic>
+        <p:nvPicPr>
+          <p:cNvPr id="78" name="图片 77">
+            <a:extLst>
+              <a:ext uri="{FF2B5EF4-FFF2-40B4-BE49-F238E27FC236}">
+                <a16:creationId xmlns:a16="http://schemas.microsoft.com/office/drawing/2014/main" id="{DCFDB086-BAC1-48BA-B9AE-8F8E07D95888}"/>
+              </a:ext>
+            </a:extLst>
+          </p:cNvPr>
+          <p:cNvPicPr>
+            <a:picLocks noChangeAspect="1"/>
+          </p:cNvPicPr>
+          <p:nvPr/>
+        </p:nvPicPr>
+        <p:blipFill>
+          <a:blip r:embed="rId3">
+            <a:extLst>
+              <a:ext uri="{28A0092B-C50C-407E-A947-70E740481C1C}">
+                <a14:useLocalDpi xmlns:a14="http://schemas.microsoft.com/office/drawing/2010/main" val="0"/>
+              </a:ext>
+            </a:extLst>
+          </a:blip>
+          <a:stretch>
+            <a:fillRect/>
+          </a:stretch>
+        </p:blipFill>
+        <p:spPr>
+          <a:xfrm>
+            <a:off x="2586540" y="2854434"/>
+            <a:ext cx="573327" cy="573327"/>
+          </a:xfrm>
+          <a:prstGeom prst="rect">
+            <a:avLst/>
+          </a:prstGeom>
+        </p:spPr>
+      </p:pic>
+      <p:pic>
+        <p:nvPicPr>
+          <p:cNvPr id="79" name="图片 78">
+            <a:extLst>
+              <a:ext uri="{FF2B5EF4-FFF2-40B4-BE49-F238E27FC236}">
+                <a16:creationId xmlns:a16="http://schemas.microsoft.com/office/drawing/2014/main" id="{0820D554-CB84-4222-9FDE-B89909353F79}"/>
+              </a:ext>
+            </a:extLst>
+          </p:cNvPr>
+          <p:cNvPicPr>
+            <a:picLocks noChangeAspect="1"/>
+          </p:cNvPicPr>
+          <p:nvPr/>
+        </p:nvPicPr>
+        <p:blipFill>
+          <a:blip r:embed="rId3">
+            <a:extLst>
+              <a:ext uri="{28A0092B-C50C-407E-A947-70E740481C1C}">
+                <a14:useLocalDpi xmlns:a14="http://schemas.microsoft.com/office/drawing/2010/main" val="0"/>
+              </a:ext>
+            </a:extLst>
+          </a:blip>
+          <a:stretch>
+            <a:fillRect/>
+          </a:stretch>
+        </p:blipFill>
+        <p:spPr>
+          <a:xfrm>
+            <a:off x="3159867" y="2854434"/>
+            <a:ext cx="573327" cy="573327"/>
+          </a:xfrm>
+          <a:prstGeom prst="rect">
+            <a:avLst/>
+          </a:prstGeom>
+        </p:spPr>
+      </p:pic>
+      <p:pic>
+        <p:nvPicPr>
+          <p:cNvPr id="80" name="图片 79">
+            <a:extLst>
+              <a:ext uri="{FF2B5EF4-FFF2-40B4-BE49-F238E27FC236}">
+                <a16:creationId xmlns:a16="http://schemas.microsoft.com/office/drawing/2014/main" id="{4A67A7EA-1B14-4D29-8FE9-30304E566343}"/>
+              </a:ext>
+            </a:extLst>
+          </p:cNvPr>
+          <p:cNvPicPr>
+            <a:picLocks noChangeAspect="1"/>
+          </p:cNvPicPr>
+          <p:nvPr/>
+        </p:nvPicPr>
+        <p:blipFill>
+          <a:blip r:embed="rId3">
+            <a:extLst>
+              <a:ext uri="{28A0092B-C50C-407E-A947-70E740481C1C}">
+                <a14:useLocalDpi xmlns:a14="http://schemas.microsoft.com/office/drawing/2010/main" val="0"/>
+              </a:ext>
+            </a:extLst>
+          </a:blip>
+          <a:stretch>
+            <a:fillRect/>
+          </a:stretch>
+        </p:blipFill>
+        <p:spPr>
+          <a:xfrm>
+            <a:off x="3742978" y="1134457"/>
+            <a:ext cx="573327" cy="573327"/>
+          </a:xfrm>
+          <a:prstGeom prst="rect">
+            <a:avLst/>
+          </a:prstGeom>
+        </p:spPr>
+      </p:pic>
+      <p:pic>
+        <p:nvPicPr>
+          <p:cNvPr id="81" name="图片 80">
+            <a:extLst>
+              <a:ext uri="{FF2B5EF4-FFF2-40B4-BE49-F238E27FC236}">
+                <a16:creationId xmlns:a16="http://schemas.microsoft.com/office/drawing/2014/main" id="{F04E1624-00A8-415E-95B4-E018F2D7B25D}"/>
+              </a:ext>
+            </a:extLst>
+          </p:cNvPr>
+          <p:cNvPicPr>
+            <a:picLocks noChangeAspect="1"/>
+          </p:cNvPicPr>
+          <p:nvPr/>
+        </p:nvPicPr>
+        <p:blipFill>
+          <a:blip r:embed="rId3">
+            <a:extLst>
+              <a:ext uri="{28A0092B-C50C-407E-A947-70E740481C1C}">
+                <a14:useLocalDpi xmlns:a14="http://schemas.microsoft.com/office/drawing/2010/main" val="0"/>
+              </a:ext>
+            </a:extLst>
+          </a:blip>
+          <a:stretch>
+            <a:fillRect/>
+          </a:stretch>
+        </p:blipFill>
+        <p:spPr>
+          <a:xfrm>
+            <a:off x="4316305" y="1134456"/>
+            <a:ext cx="573327" cy="573327"/>
+          </a:xfrm>
+          <a:prstGeom prst="rect">
+            <a:avLst/>
+          </a:prstGeom>
+        </p:spPr>
+      </p:pic>
+      <p:pic>
+        <p:nvPicPr>
+          <p:cNvPr id="82" name="图片 81">
+            <a:extLst>
+              <a:ext uri="{FF2B5EF4-FFF2-40B4-BE49-F238E27FC236}">
+                <a16:creationId xmlns:a16="http://schemas.microsoft.com/office/drawing/2014/main" id="{3DBA1EFF-F6FE-4D3A-AEAB-261705CC6F47}"/>
+              </a:ext>
+            </a:extLst>
+          </p:cNvPr>
+          <p:cNvPicPr>
+            <a:picLocks noChangeAspect="1"/>
+          </p:cNvPicPr>
+          <p:nvPr/>
+        </p:nvPicPr>
+        <p:blipFill>
+          <a:blip r:embed="rId3">
+            <a:extLst>
+              <a:ext uri="{28A0092B-C50C-407E-A947-70E740481C1C}">
+                <a14:useLocalDpi xmlns:a14="http://schemas.microsoft.com/office/drawing/2010/main" val="0"/>
+              </a:ext>
+            </a:extLst>
+          </a:blip>
+          <a:stretch>
+            <a:fillRect/>
+          </a:stretch>
+        </p:blipFill>
+        <p:spPr>
+          <a:xfrm>
+            <a:off x="4889632" y="1134456"/>
+            <a:ext cx="573327" cy="573327"/>
+          </a:xfrm>
+          <a:prstGeom prst="rect">
+            <a:avLst/>
+          </a:prstGeom>
+        </p:spPr>
+      </p:pic>
+      <p:pic>
+        <p:nvPicPr>
+          <p:cNvPr id="83" name="图片 82">
+            <a:extLst>
+              <a:ext uri="{FF2B5EF4-FFF2-40B4-BE49-F238E27FC236}">
+                <a16:creationId xmlns:a16="http://schemas.microsoft.com/office/drawing/2014/main" id="{72D2FD16-2F2E-4921-913C-3D44FB56D972}"/>
+              </a:ext>
+            </a:extLst>
+          </p:cNvPr>
+          <p:cNvPicPr>
+            <a:picLocks noChangeAspect="1"/>
+          </p:cNvPicPr>
+          <p:nvPr/>
+        </p:nvPicPr>
+        <p:blipFill>
+          <a:blip r:embed="rId3">
+            <a:extLst>
+              <a:ext uri="{28A0092B-C50C-407E-A947-70E740481C1C}">
+                <a14:useLocalDpi xmlns:a14="http://schemas.microsoft.com/office/drawing/2010/main" val="0"/>
+              </a:ext>
+            </a:extLst>
+          </a:blip>
+          <a:stretch>
+            <a:fillRect/>
+          </a:stretch>
+        </p:blipFill>
+        <p:spPr>
+          <a:xfrm>
+            <a:off x="3742978" y="1707784"/>
+            <a:ext cx="573327" cy="573327"/>
+          </a:xfrm>
+          <a:prstGeom prst="rect">
+            <a:avLst/>
+          </a:prstGeom>
+        </p:spPr>
+      </p:pic>
+      <p:pic>
+        <p:nvPicPr>
+          <p:cNvPr id="84" name="图片 83">
+            <a:extLst>
+              <a:ext uri="{FF2B5EF4-FFF2-40B4-BE49-F238E27FC236}">
+                <a16:creationId xmlns:a16="http://schemas.microsoft.com/office/drawing/2014/main" id="{AB736B58-7136-4C40-A98C-AE9EA458E1C0}"/>
+              </a:ext>
+            </a:extLst>
+          </p:cNvPr>
+          <p:cNvPicPr>
+            <a:picLocks noChangeAspect="1"/>
+          </p:cNvPicPr>
+          <p:nvPr/>
+        </p:nvPicPr>
+        <p:blipFill>
+          <a:blip r:embed="rId3">
+            <a:extLst>
+              <a:ext uri="{28A0092B-C50C-407E-A947-70E740481C1C}">
+                <a14:useLocalDpi xmlns:a14="http://schemas.microsoft.com/office/drawing/2010/main" val="0"/>
+              </a:ext>
+            </a:extLst>
+          </a:blip>
+          <a:stretch>
+            <a:fillRect/>
+          </a:stretch>
+        </p:blipFill>
+        <p:spPr>
+          <a:xfrm>
+            <a:off x="4316305" y="1707783"/>
+            <a:ext cx="573327" cy="573327"/>
+          </a:xfrm>
+          <a:prstGeom prst="rect">
+            <a:avLst/>
+          </a:prstGeom>
+        </p:spPr>
+      </p:pic>
+      <p:pic>
+        <p:nvPicPr>
+          <p:cNvPr id="85" name="图片 84">
+            <a:extLst>
+              <a:ext uri="{FF2B5EF4-FFF2-40B4-BE49-F238E27FC236}">
+                <a16:creationId xmlns:a16="http://schemas.microsoft.com/office/drawing/2014/main" id="{2CF7B92F-C434-4807-8ABF-76E6004FCB07}"/>
+              </a:ext>
+            </a:extLst>
+          </p:cNvPr>
+          <p:cNvPicPr>
+            <a:picLocks noChangeAspect="1"/>
+          </p:cNvPicPr>
+          <p:nvPr/>
+        </p:nvPicPr>
+        <p:blipFill>
+          <a:blip r:embed="rId3">
+            <a:extLst>
+              <a:ext uri="{28A0092B-C50C-407E-A947-70E740481C1C}">
+                <a14:useLocalDpi xmlns:a14="http://schemas.microsoft.com/office/drawing/2010/main" val="0"/>
+              </a:ext>
+            </a:extLst>
+          </a:blip>
+          <a:stretch>
+            <a:fillRect/>
+          </a:stretch>
+        </p:blipFill>
+        <p:spPr>
+          <a:xfrm>
+            <a:off x="4889632" y="1707783"/>
+            <a:ext cx="573327" cy="573327"/>
+          </a:xfrm>
+          <a:prstGeom prst="rect">
+            <a:avLst/>
+          </a:prstGeom>
+        </p:spPr>
+      </p:pic>
+      <p:pic>
+        <p:nvPicPr>
+          <p:cNvPr id="86" name="图片 85">
+            <a:extLst>
+              <a:ext uri="{FF2B5EF4-FFF2-40B4-BE49-F238E27FC236}">
+                <a16:creationId xmlns:a16="http://schemas.microsoft.com/office/drawing/2014/main" id="{54A7CB7A-FFE9-4929-B83E-2BB727DA4D3A}"/>
+              </a:ext>
+            </a:extLst>
+          </p:cNvPr>
+          <p:cNvPicPr>
+            <a:picLocks noChangeAspect="1"/>
+          </p:cNvPicPr>
+          <p:nvPr/>
+        </p:nvPicPr>
+        <p:blipFill>
+          <a:blip r:embed="rId3">
+            <a:extLst>
+              <a:ext uri="{28A0092B-C50C-407E-A947-70E740481C1C}">
+                <a14:useLocalDpi xmlns:a14="http://schemas.microsoft.com/office/drawing/2010/main" val="0"/>
+              </a:ext>
+            </a:extLst>
+          </a:blip>
+          <a:stretch>
+            <a:fillRect/>
+          </a:stretch>
+        </p:blipFill>
+        <p:spPr>
+          <a:xfrm>
+            <a:off x="3738086" y="2281107"/>
+            <a:ext cx="573327" cy="573327"/>
+          </a:xfrm>
+          <a:prstGeom prst="rect">
+            <a:avLst/>
+          </a:prstGeom>
+        </p:spPr>
+      </p:pic>
+      <p:pic>
+        <p:nvPicPr>
+          <p:cNvPr id="87" name="图片 86">
+            <a:extLst>
+              <a:ext uri="{FF2B5EF4-FFF2-40B4-BE49-F238E27FC236}">
+                <a16:creationId xmlns:a16="http://schemas.microsoft.com/office/drawing/2014/main" id="{7A368F5A-1252-49F5-A07F-BE490E0D0B25}"/>
+              </a:ext>
+            </a:extLst>
+          </p:cNvPr>
+          <p:cNvPicPr>
+            <a:picLocks noChangeAspect="1"/>
+          </p:cNvPicPr>
+          <p:nvPr/>
+        </p:nvPicPr>
+        <p:blipFill>
+          <a:blip r:embed="rId3">
+            <a:extLst>
+              <a:ext uri="{28A0092B-C50C-407E-A947-70E740481C1C}">
+                <a14:useLocalDpi xmlns:a14="http://schemas.microsoft.com/office/drawing/2010/main" val="0"/>
+              </a:ext>
+            </a:extLst>
+          </a:blip>
+          <a:stretch>
+            <a:fillRect/>
+          </a:stretch>
+        </p:blipFill>
+        <p:spPr>
+          <a:xfrm>
+            <a:off x="4311413" y="2281106"/>
+            <a:ext cx="573327" cy="573327"/>
+          </a:xfrm>
+          <a:prstGeom prst="rect">
+            <a:avLst/>
+          </a:prstGeom>
+        </p:spPr>
+      </p:pic>
+      <p:pic>
+        <p:nvPicPr>
+          <p:cNvPr id="88" name="图片 87">
+            <a:extLst>
+              <a:ext uri="{FF2B5EF4-FFF2-40B4-BE49-F238E27FC236}">
+                <a16:creationId xmlns:a16="http://schemas.microsoft.com/office/drawing/2014/main" id="{B11C3602-03F4-4F0B-A905-4B15F4C51717}"/>
+              </a:ext>
+            </a:extLst>
+          </p:cNvPr>
+          <p:cNvPicPr>
+            <a:picLocks noChangeAspect="1"/>
+          </p:cNvPicPr>
+          <p:nvPr/>
+        </p:nvPicPr>
+        <p:blipFill>
+          <a:blip r:embed="rId3">
+            <a:extLst>
+              <a:ext uri="{28A0092B-C50C-407E-A947-70E740481C1C}">
+                <a14:useLocalDpi xmlns:a14="http://schemas.microsoft.com/office/drawing/2010/main" val="0"/>
+              </a:ext>
+            </a:extLst>
+          </a:blip>
+          <a:stretch>
+            <a:fillRect/>
+          </a:stretch>
+        </p:blipFill>
+        <p:spPr>
+          <a:xfrm>
+            <a:off x="4884740" y="2281106"/>
+            <a:ext cx="573327" cy="573327"/>
+          </a:xfrm>
+          <a:prstGeom prst="rect">
+            <a:avLst/>
+          </a:prstGeom>
+        </p:spPr>
+      </p:pic>
+      <p:pic>
+        <p:nvPicPr>
+          <p:cNvPr id="89" name="图片 88">
+            <a:extLst>
+              <a:ext uri="{FF2B5EF4-FFF2-40B4-BE49-F238E27FC236}">
+                <a16:creationId xmlns:a16="http://schemas.microsoft.com/office/drawing/2014/main" id="{5DD37910-5C79-461F-810D-F615D1F49D9C}"/>
+              </a:ext>
+            </a:extLst>
+          </p:cNvPr>
+          <p:cNvPicPr>
+            <a:picLocks noChangeAspect="1"/>
+          </p:cNvPicPr>
+          <p:nvPr/>
+        </p:nvPicPr>
+        <p:blipFill>
+          <a:blip r:embed="rId3">
+            <a:extLst>
+              <a:ext uri="{28A0092B-C50C-407E-A947-70E740481C1C}">
+                <a14:useLocalDpi xmlns:a14="http://schemas.microsoft.com/office/drawing/2010/main" val="0"/>
+              </a:ext>
+            </a:extLst>
+          </a:blip>
+          <a:stretch>
+            <a:fillRect/>
+          </a:stretch>
+        </p:blipFill>
+        <p:spPr>
+          <a:xfrm>
+            <a:off x="3738086" y="2854434"/>
+            <a:ext cx="573327" cy="573327"/>
+          </a:xfrm>
+          <a:prstGeom prst="rect">
+            <a:avLst/>
+          </a:prstGeom>
+        </p:spPr>
+      </p:pic>
+      <p:pic>
+        <p:nvPicPr>
+          <p:cNvPr id="90" name="图片 89">
+            <a:extLst>
+              <a:ext uri="{FF2B5EF4-FFF2-40B4-BE49-F238E27FC236}">
+                <a16:creationId xmlns:a16="http://schemas.microsoft.com/office/drawing/2014/main" id="{57363804-0783-44E0-9E47-0995EF4788F0}"/>
+              </a:ext>
+            </a:extLst>
+          </p:cNvPr>
+          <p:cNvPicPr>
+            <a:picLocks noChangeAspect="1"/>
+          </p:cNvPicPr>
+          <p:nvPr/>
+        </p:nvPicPr>
+        <p:blipFill>
+          <a:blip r:embed="rId3">
+            <a:extLst>
+              <a:ext uri="{28A0092B-C50C-407E-A947-70E740481C1C}">
+                <a14:useLocalDpi xmlns:a14="http://schemas.microsoft.com/office/drawing/2010/main" val="0"/>
+              </a:ext>
+            </a:extLst>
+          </a:blip>
+          <a:stretch>
+            <a:fillRect/>
+          </a:stretch>
+        </p:blipFill>
+        <p:spPr>
+          <a:xfrm>
+            <a:off x="4311413" y="2854433"/>
+            <a:ext cx="573327" cy="573327"/>
+          </a:xfrm>
+          <a:prstGeom prst="rect">
+            <a:avLst/>
+          </a:prstGeom>
+        </p:spPr>
+      </p:pic>
+      <p:pic>
+        <p:nvPicPr>
+          <p:cNvPr id="91" name="图片 90">
+            <a:extLst>
+              <a:ext uri="{FF2B5EF4-FFF2-40B4-BE49-F238E27FC236}">
+                <a16:creationId xmlns:a16="http://schemas.microsoft.com/office/drawing/2014/main" id="{0FDD71E5-45AC-4F8C-8984-2D781A6E3164}"/>
+              </a:ext>
+            </a:extLst>
+          </p:cNvPr>
+          <p:cNvPicPr>
+            <a:picLocks noChangeAspect="1"/>
+          </p:cNvPicPr>
+          <p:nvPr/>
+        </p:nvPicPr>
+        <p:blipFill>
+          <a:blip r:embed="rId3">
+            <a:extLst>
+              <a:ext uri="{28A0092B-C50C-407E-A947-70E740481C1C}">
+                <a14:useLocalDpi xmlns:a14="http://schemas.microsoft.com/office/drawing/2010/main" val="0"/>
+              </a:ext>
+            </a:extLst>
+          </a:blip>
+          <a:stretch>
+            <a:fillRect/>
+          </a:stretch>
+        </p:blipFill>
+        <p:spPr>
+          <a:xfrm>
+            <a:off x="4884740" y="2854433"/>
+            <a:ext cx="573327" cy="573327"/>
+          </a:xfrm>
+          <a:prstGeom prst="rect">
+            <a:avLst/>
+          </a:prstGeom>
+        </p:spPr>
+      </p:pic>
+      <p:pic>
+        <p:nvPicPr>
+          <p:cNvPr id="92" name="图片 91">
+            <a:extLst>
+              <a:ext uri="{FF2B5EF4-FFF2-40B4-BE49-F238E27FC236}">
+                <a16:creationId xmlns:a16="http://schemas.microsoft.com/office/drawing/2014/main" id="{D949FD53-1EC4-47D5-BEC9-3355508014BA}"/>
+              </a:ext>
+            </a:extLst>
+          </p:cNvPr>
+          <p:cNvPicPr>
+            <a:picLocks noChangeAspect="1"/>
+          </p:cNvPicPr>
+          <p:nvPr/>
+        </p:nvPicPr>
+        <p:blipFill>
+          <a:blip r:embed="rId3">
+            <a:extLst>
+              <a:ext uri="{28A0092B-C50C-407E-A947-70E740481C1C}">
+                <a14:useLocalDpi xmlns:a14="http://schemas.microsoft.com/office/drawing/2010/main" val="0"/>
+              </a:ext>
+            </a:extLst>
+          </a:blip>
+          <a:stretch>
+            <a:fillRect/>
+          </a:stretch>
+        </p:blipFill>
+        <p:spPr>
+          <a:xfrm>
+            <a:off x="3159867" y="3427755"/>
+            <a:ext cx="573327" cy="573327"/>
+          </a:xfrm>
+          <a:prstGeom prst="rect">
+            <a:avLst/>
+          </a:prstGeom>
+        </p:spPr>
+      </p:pic>
+      <p:pic>
+        <p:nvPicPr>
+          <p:cNvPr id="93" name="图片 92">
+            <a:extLst>
+              <a:ext uri="{FF2B5EF4-FFF2-40B4-BE49-F238E27FC236}">
+                <a16:creationId xmlns:a16="http://schemas.microsoft.com/office/drawing/2014/main" id="{B3406CAD-4041-4243-8DF4-734354C79E56}"/>
+              </a:ext>
+            </a:extLst>
+          </p:cNvPr>
+          <p:cNvPicPr>
+            <a:picLocks noChangeAspect="1"/>
+          </p:cNvPicPr>
+          <p:nvPr/>
+        </p:nvPicPr>
+        <p:blipFill>
+          <a:blip r:embed="rId3">
+            <a:extLst>
+              <a:ext uri="{28A0092B-C50C-407E-A947-70E740481C1C}">
+                <a14:useLocalDpi xmlns:a14="http://schemas.microsoft.com/office/drawing/2010/main" val="0"/>
+              </a:ext>
+            </a:extLst>
+          </a:blip>
+          <a:stretch>
+            <a:fillRect/>
+          </a:stretch>
+        </p:blipFill>
+        <p:spPr>
+          <a:xfrm>
+            <a:off x="3733194" y="3427754"/>
+            <a:ext cx="573327" cy="573327"/>
+          </a:xfrm>
+          <a:prstGeom prst="rect">
+            <a:avLst/>
+          </a:prstGeom>
+        </p:spPr>
+      </p:pic>
+      <p:pic>
+        <p:nvPicPr>
+          <p:cNvPr id="94" name="图片 93">
+            <a:extLst>
+              <a:ext uri="{FF2B5EF4-FFF2-40B4-BE49-F238E27FC236}">
+                <a16:creationId xmlns:a16="http://schemas.microsoft.com/office/drawing/2014/main" id="{332BEDCA-246E-4053-A965-93A8D71B84E5}"/>
+              </a:ext>
+            </a:extLst>
+          </p:cNvPr>
+          <p:cNvPicPr>
+            <a:picLocks noChangeAspect="1"/>
+          </p:cNvPicPr>
+          <p:nvPr/>
+        </p:nvPicPr>
+        <p:blipFill>
+          <a:blip r:embed="rId3">
+            <a:extLst>
+              <a:ext uri="{28A0092B-C50C-407E-A947-70E740481C1C}">
+                <a14:useLocalDpi xmlns:a14="http://schemas.microsoft.com/office/drawing/2010/main" val="0"/>
+              </a:ext>
+            </a:extLst>
+          </a:blip>
+          <a:stretch>
+            <a:fillRect/>
+          </a:stretch>
+        </p:blipFill>
+        <p:spPr>
+          <a:xfrm>
+            <a:off x="2586540" y="3427753"/>
+            <a:ext cx="573327" cy="573327"/>
+          </a:xfrm>
+          <a:prstGeom prst="rect">
+            <a:avLst/>
+          </a:prstGeom>
+        </p:spPr>
+      </p:pic>
+      <p:pic>
+        <p:nvPicPr>
+          <p:cNvPr id="3" name="图片 2">
+            <a:extLst>
+              <a:ext uri="{FF2B5EF4-FFF2-40B4-BE49-F238E27FC236}">
+                <a16:creationId xmlns:a16="http://schemas.microsoft.com/office/drawing/2014/main" id="{C7B4CF32-B802-4EB6-ABEC-49F757274648}"/>
+              </a:ext>
+            </a:extLst>
+          </p:cNvPr>
+          <p:cNvPicPr>
+            <a:picLocks noChangeAspect="1"/>
+          </p:cNvPicPr>
+          <p:nvPr/>
+        </p:nvPicPr>
+        <p:blipFill>
+          <a:blip r:embed="rId6">
+            <a:clrChange>
+              <a:clrFrom>
+                <a:srgbClr val="000000"/>
+              </a:clrFrom>
+              <a:clrTo>
+                <a:srgbClr val="000000">
+                  <a:alpha val="0"/>
+                </a:srgbClr>
+              </a:clrTo>
+            </a:clrChange>
+            <a:extLst>
+              <a:ext uri="{28A0092B-C50C-407E-A947-70E740481C1C}">
+                <a14:useLocalDpi xmlns:a14="http://schemas.microsoft.com/office/drawing/2010/main" val="0"/>
+              </a:ext>
+            </a:extLst>
+          </a:blip>
+          <a:stretch>
+            <a:fillRect/>
+          </a:stretch>
+        </p:blipFill>
+        <p:spPr>
+          <a:xfrm>
+            <a:off x="2233023" y="1417842"/>
+            <a:ext cx="2369945" cy="2369945"/>
+          </a:xfrm>
+          <a:prstGeom prst="rect">
+            <a:avLst/>
+          </a:prstGeom>
+        </p:spPr>
+      </p:pic>
+      <p:pic>
+        <p:nvPicPr>
+          <p:cNvPr id="95" name="图片 94">
+            <a:extLst>
+              <a:ext uri="{FF2B5EF4-FFF2-40B4-BE49-F238E27FC236}">
+                <a16:creationId xmlns:a16="http://schemas.microsoft.com/office/drawing/2014/main" id="{BA88B3CA-8E53-4C50-97AC-34754D2EEE24}"/>
+              </a:ext>
+            </a:extLst>
+          </p:cNvPr>
+          <p:cNvPicPr>
+            <a:picLocks noChangeAspect="1"/>
+          </p:cNvPicPr>
+          <p:nvPr/>
+        </p:nvPicPr>
+        <p:blipFill>
+          <a:blip r:embed="rId4">
+            <a:extLst>
+              <a:ext uri="{28A0092B-C50C-407E-A947-70E740481C1C}">
+                <a14:useLocalDpi xmlns:a14="http://schemas.microsoft.com/office/drawing/2010/main" val="0"/>
+              </a:ext>
+            </a:extLst>
+          </a:blip>
+          <a:stretch>
+            <a:fillRect/>
+          </a:stretch>
+        </p:blipFill>
+        <p:spPr>
+          <a:xfrm>
+            <a:off x="-733795" y="5229988"/>
+            <a:ext cx="1268914" cy="933960"/>
+          </a:xfrm>
+          <a:prstGeom prst="rect">
+            <a:avLst/>
+          </a:prstGeom>
+        </p:spPr>
+      </p:pic>
+    </p:spTree>
+    <p:extLst>
+      <p:ext uri="{BB962C8B-B14F-4D97-AF65-F5344CB8AC3E}">
+        <p14:creationId xmlns:p14="http://schemas.microsoft.com/office/powerpoint/2010/main" val="2615722745"/>
       </p:ext>
     </p:extLst>
   </p:cSld>

</xml_diff>